<commit_message>
add: add all (#2)
</commit_message>
<xml_diff>
--- a/Homeworks/Homework_2/H2_Project/docs/Images.pptx
+++ b/Homeworks/Homework_2/H2_Project/docs/Images.pptx
@@ -264,7 +264,7 @@
           <a:p>
             <a:fld id="{F6DF1F89-F977-EF40-BF6B-D9B2D39A82E4}" type="datetimeFigureOut">
               <a:rPr lang="en-CN" smtClean="0"/>
-              <a:t>2025/3/10</a:t>
+              <a:t>2025/3/22</a:t>
             </a:fld>
             <a:endParaRPr lang="en-CN"/>
           </a:p>
@@ -464,7 +464,7 @@
           <a:p>
             <a:fld id="{F6DF1F89-F977-EF40-BF6B-D9B2D39A82E4}" type="datetimeFigureOut">
               <a:rPr lang="en-CN" smtClean="0"/>
-              <a:t>2025/3/10</a:t>
+              <a:t>2025/3/22</a:t>
             </a:fld>
             <a:endParaRPr lang="en-CN"/>
           </a:p>
@@ -674,7 +674,7 @@
           <a:p>
             <a:fld id="{F6DF1F89-F977-EF40-BF6B-D9B2D39A82E4}" type="datetimeFigureOut">
               <a:rPr lang="en-CN" smtClean="0"/>
-              <a:t>2025/3/10</a:t>
+              <a:t>2025/3/22</a:t>
             </a:fld>
             <a:endParaRPr lang="en-CN"/>
           </a:p>
@@ -874,7 +874,7 @@
           <a:p>
             <a:fld id="{F6DF1F89-F977-EF40-BF6B-D9B2D39A82E4}" type="datetimeFigureOut">
               <a:rPr lang="en-CN" smtClean="0"/>
-              <a:t>2025/3/10</a:t>
+              <a:t>2025/3/22</a:t>
             </a:fld>
             <a:endParaRPr lang="en-CN"/>
           </a:p>
@@ -1150,7 +1150,7 @@
           <a:p>
             <a:fld id="{F6DF1F89-F977-EF40-BF6B-D9B2D39A82E4}" type="datetimeFigureOut">
               <a:rPr lang="en-CN" smtClean="0"/>
-              <a:t>2025/3/10</a:t>
+              <a:t>2025/3/22</a:t>
             </a:fld>
             <a:endParaRPr lang="en-CN"/>
           </a:p>
@@ -1418,7 +1418,7 @@
           <a:p>
             <a:fld id="{F6DF1F89-F977-EF40-BF6B-D9B2D39A82E4}" type="datetimeFigureOut">
               <a:rPr lang="en-CN" smtClean="0"/>
-              <a:t>2025/3/10</a:t>
+              <a:t>2025/3/22</a:t>
             </a:fld>
             <a:endParaRPr lang="en-CN"/>
           </a:p>
@@ -1833,7 +1833,7 @@
           <a:p>
             <a:fld id="{F6DF1F89-F977-EF40-BF6B-D9B2D39A82E4}" type="datetimeFigureOut">
               <a:rPr lang="en-CN" smtClean="0"/>
-              <a:t>2025/3/10</a:t>
+              <a:t>2025/3/22</a:t>
             </a:fld>
             <a:endParaRPr lang="en-CN"/>
           </a:p>
@@ -1975,7 +1975,7 @@
           <a:p>
             <a:fld id="{F6DF1F89-F977-EF40-BF6B-D9B2D39A82E4}" type="datetimeFigureOut">
               <a:rPr lang="en-CN" smtClean="0"/>
-              <a:t>2025/3/10</a:t>
+              <a:t>2025/3/22</a:t>
             </a:fld>
             <a:endParaRPr lang="en-CN"/>
           </a:p>
@@ -2088,7 +2088,7 @@
           <a:p>
             <a:fld id="{F6DF1F89-F977-EF40-BF6B-D9B2D39A82E4}" type="datetimeFigureOut">
               <a:rPr lang="en-CN" smtClean="0"/>
-              <a:t>2025/3/10</a:t>
+              <a:t>2025/3/22</a:t>
             </a:fld>
             <a:endParaRPr lang="en-CN"/>
           </a:p>
@@ -2401,7 +2401,7 @@
           <a:p>
             <a:fld id="{F6DF1F89-F977-EF40-BF6B-D9B2D39A82E4}" type="datetimeFigureOut">
               <a:rPr lang="en-CN" smtClean="0"/>
-              <a:t>2025/3/10</a:t>
+              <a:t>2025/3/22</a:t>
             </a:fld>
             <a:endParaRPr lang="en-CN"/>
           </a:p>
@@ -2690,7 +2690,7 @@
           <a:p>
             <a:fld id="{F6DF1F89-F977-EF40-BF6B-D9B2D39A82E4}" type="datetimeFigureOut">
               <a:rPr lang="en-CN" smtClean="0"/>
-              <a:t>2025/3/10</a:t>
+              <a:t>2025/3/22</a:t>
             </a:fld>
             <a:endParaRPr lang="en-CN"/>
           </a:p>
@@ -2933,7 +2933,7 @@
           <a:p>
             <a:fld id="{F6DF1F89-F977-EF40-BF6B-D9B2D39A82E4}" type="datetimeFigureOut">
               <a:rPr lang="en-CN" smtClean="0"/>
-              <a:t>2025/3/10</a:t>
+              <a:t>2025/3/22</a:t>
             </a:fld>
             <a:endParaRPr lang="en-CN"/>
           </a:p>
@@ -3350,4187 +3350,344 @@
           <a:chExt cx="0" cy="0"/>
         </a:xfrm>
       </p:grpSpPr>
-      <p:grpSp>
-        <p:nvGrpSpPr>
-          <p:cNvPr id="238" name="Group 237">
+      <p:sp>
+        <p:nvSpPr>
+          <p:cNvPr id="41" name="TextBox 40">
             <a:extLst>
               <a:ext uri="{FF2B5EF4-FFF2-40B4-BE49-F238E27FC236}">
-                <a16:creationId xmlns:a16="http://schemas.microsoft.com/office/drawing/2014/main" id="{CE2137D8-8002-324D-AF55-B8AD553E3918}"/>
+                <a16:creationId xmlns:a16="http://schemas.microsoft.com/office/drawing/2014/main" id="{7B3D1BE0-CF63-654C-8245-E74DF6F92B92}"/>
               </a:ext>
             </a:extLst>
           </p:cNvPr>
-          <p:cNvGrpSpPr/>
+          <p:cNvSpPr txBox="1"/>
           <p:nvPr/>
-        </p:nvGrpSpPr>
-        <p:grpSpPr>
+        </p:nvSpPr>
+        <p:spPr>
           <a:xfrm>
-            <a:off x="1135373" y="236531"/>
-            <a:ext cx="9921254" cy="6384937"/>
-            <a:chOff x="1924546" y="48737"/>
-            <a:chExt cx="9921254" cy="6384937"/>
+            <a:off x="5763919" y="2496458"/>
+            <a:ext cx="1701751" cy="369332"/>
           </a:xfrm>
-        </p:grpSpPr>
-        <p:grpSp>
-          <p:nvGrpSpPr>
-            <p:cNvPr id="236" name="Group 235">
-              <a:extLst>
-                <a:ext uri="{FF2B5EF4-FFF2-40B4-BE49-F238E27FC236}">
-                  <a16:creationId xmlns:a16="http://schemas.microsoft.com/office/drawing/2014/main" id="{95EE327C-9534-B54B-9CBA-DB1DA06B8D7A}"/>
-                </a:ext>
-              </a:extLst>
-            </p:cNvPr>
-            <p:cNvGrpSpPr/>
-            <p:nvPr/>
-          </p:nvGrpSpPr>
-          <p:grpSpPr>
-            <a:xfrm>
-              <a:off x="2397706" y="167935"/>
-              <a:ext cx="8974933" cy="6146540"/>
-              <a:chOff x="2248862" y="148503"/>
-              <a:chExt cx="8974933" cy="6146540"/>
-            </a:xfrm>
-          </p:grpSpPr>
-          <p:sp>
-            <p:nvSpPr>
-              <p:cNvPr id="11" name="TextBox 10">
-                <a:extLst>
-                  <a:ext uri="{FF2B5EF4-FFF2-40B4-BE49-F238E27FC236}">
-                    <a16:creationId xmlns:a16="http://schemas.microsoft.com/office/drawing/2014/main" id="{5B4544CC-9842-394E-84AC-8BDC67FE1150}"/>
-                  </a:ext>
-                </a:extLst>
-              </p:cNvPr>
-              <p:cNvSpPr txBox="1"/>
-              <p:nvPr/>
-            </p:nvSpPr>
-            <p:spPr>
-              <a:xfrm>
-                <a:off x="2576899" y="3833090"/>
-                <a:ext cx="1319645" cy="369332"/>
-              </a:xfrm>
-              <a:prstGeom prst="rect">
-                <a:avLst/>
-              </a:prstGeom>
-              <a:noFill/>
-            </p:spPr>
-            <p:txBody>
-              <a:bodyPr wrap="square" rtlCol="0">
-                <a:spAutoFit/>
-              </a:bodyPr>
-              <a:lstStyle/>
-              <a:p>
-                <a:pPr algn="ctr"/>
-                <a:r>
-                  <a:rPr lang="en-CN" b="1" dirty="0">
-                    <a:latin typeface="Times New Roman" panose="02020603050405020304" pitchFamily="18" charset="0"/>
-                    <a:cs typeface="Times New Roman" panose="02020603050405020304" pitchFamily="18" charset="0"/>
-                  </a:rPr>
-                  <a:t>TX 1</a:t>
-                </a:r>
-              </a:p>
-            </p:txBody>
-          </p:sp>
-          <p:cxnSp>
-            <p:nvCxnSpPr>
-              <p:cNvPr id="13" name="Straight Connector 12">
-                <a:extLst>
-                  <a:ext uri="{FF2B5EF4-FFF2-40B4-BE49-F238E27FC236}">
-                    <a16:creationId xmlns:a16="http://schemas.microsoft.com/office/drawing/2014/main" id="{A55893B0-B3E0-8846-8333-A2A9CAF7AF23}"/>
-                  </a:ext>
-                </a:extLst>
-              </p:cNvPr>
-              <p:cNvCxnSpPr/>
-              <p:nvPr/>
-            </p:nvCxnSpPr>
-            <p:spPr>
-              <a:xfrm>
-                <a:off x="2576899" y="466723"/>
-                <a:ext cx="1319645" cy="0"/>
-              </a:xfrm>
-              <a:prstGeom prst="line">
-                <a:avLst/>
-              </a:prstGeom>
-              <a:ln w="19050">
-                <a:solidFill>
-                  <a:schemeClr val="tx1"/>
-                </a:solidFill>
-              </a:ln>
-            </p:spPr>
-            <p:style>
-              <a:lnRef idx="1">
-                <a:schemeClr val="accent1"/>
-              </a:lnRef>
-              <a:fillRef idx="0">
-                <a:schemeClr val="accent1"/>
-              </a:fillRef>
-              <a:effectRef idx="0">
-                <a:schemeClr val="accent1"/>
-              </a:effectRef>
-              <a:fontRef idx="minor">
-                <a:schemeClr val="tx1"/>
-              </a:fontRef>
-            </p:style>
-          </p:cxnSp>
-          <p:sp>
-            <p:nvSpPr>
-              <p:cNvPr id="15" name="TextBox 14">
-                <a:extLst>
-                  <a:ext uri="{FF2B5EF4-FFF2-40B4-BE49-F238E27FC236}">
-                    <a16:creationId xmlns:a16="http://schemas.microsoft.com/office/drawing/2014/main" id="{44829264-D44F-3E4B-A2E8-C693B0E00060}"/>
-                  </a:ext>
-                </a:extLst>
-              </p:cNvPr>
-              <p:cNvSpPr txBox="1"/>
-              <p:nvPr/>
-            </p:nvSpPr>
-            <p:spPr>
-              <a:xfrm>
-                <a:off x="2576899" y="154709"/>
-                <a:ext cx="1319645" cy="323165"/>
-              </a:xfrm>
-              <a:prstGeom prst="rect">
-                <a:avLst/>
-              </a:prstGeom>
-              <a:noFill/>
-            </p:spPr>
-            <p:txBody>
-              <a:bodyPr wrap="square" rtlCol="0">
-                <a:spAutoFit/>
-              </a:bodyPr>
-              <a:lstStyle/>
-              <a:p>
-                <a:pPr algn="ctr"/>
-                <a:r>
-                  <a:rPr lang="en-US" sz="1500" dirty="0"/>
-                  <a:t>h</a:t>
-                </a:r>
-                <a:r>
-                  <a:rPr lang="en-US" sz="1500" dirty="0">
-                    <a:effectLst/>
-                  </a:rPr>
-                  <a:t>ash_1</a:t>
-                </a:r>
-              </a:p>
-            </p:txBody>
-          </p:sp>
-          <p:sp>
-            <p:nvSpPr>
-              <p:cNvPr id="16" name="Rectangle 15">
-                <a:extLst>
-                  <a:ext uri="{FF2B5EF4-FFF2-40B4-BE49-F238E27FC236}">
-                    <a16:creationId xmlns:a16="http://schemas.microsoft.com/office/drawing/2014/main" id="{0C25B4FA-B048-964D-97D1-33F11D2B9FE6}"/>
-                  </a:ext>
-                </a:extLst>
-              </p:cNvPr>
-              <p:cNvSpPr/>
-              <p:nvPr/>
-            </p:nvSpPr>
-            <p:spPr>
-              <a:xfrm>
-                <a:off x="2762793" y="729417"/>
-                <a:ext cx="947853" cy="1260087"/>
-              </a:xfrm>
-              <a:prstGeom prst="rect">
-                <a:avLst/>
-              </a:prstGeom>
-              <a:noFill/>
-              <a:ln w="19050">
-                <a:solidFill>
-                  <a:schemeClr val="accent2"/>
-                </a:solidFill>
-              </a:ln>
-            </p:spPr>
-            <p:style>
-              <a:lnRef idx="2">
-                <a:schemeClr val="accent1">
-                  <a:shade val="50000"/>
-                </a:schemeClr>
-              </a:lnRef>
-              <a:fillRef idx="1">
-                <a:schemeClr val="accent1"/>
-              </a:fillRef>
-              <a:effectRef idx="0">
-                <a:schemeClr val="accent1"/>
-              </a:effectRef>
-              <a:fontRef idx="minor">
-                <a:schemeClr val="lt1"/>
-              </a:fontRef>
-            </p:style>
-            <p:txBody>
-              <a:bodyPr rtlCol="0" anchor="ctr"/>
-              <a:lstStyle/>
-              <a:p>
-                <a:pPr algn="ctr"/>
-                <a:endParaRPr lang="en-CN">
-                  <a:solidFill>
-                    <a:schemeClr val="accent2">
-                      <a:lumMod val="50000"/>
-                    </a:schemeClr>
-                  </a:solidFill>
-                </a:endParaRPr>
-              </a:p>
-            </p:txBody>
-          </p:sp>
-          <p:sp>
-            <p:nvSpPr>
-              <p:cNvPr id="17" name="Rectangle 16">
-                <a:extLst>
-                  <a:ext uri="{FF2B5EF4-FFF2-40B4-BE49-F238E27FC236}">
-                    <a16:creationId xmlns:a16="http://schemas.microsoft.com/office/drawing/2014/main" id="{A9708BE8-6255-ED4B-8A09-FCE15404E816}"/>
-                  </a:ext>
-                </a:extLst>
-              </p:cNvPr>
-              <p:cNvSpPr/>
-              <p:nvPr/>
-            </p:nvSpPr>
-            <p:spPr>
-              <a:xfrm>
-                <a:off x="2762793" y="2278578"/>
-                <a:ext cx="947853" cy="1260087"/>
-              </a:xfrm>
-              <a:prstGeom prst="rect">
-                <a:avLst/>
-              </a:prstGeom>
-              <a:noFill/>
-              <a:ln w="19050">
-                <a:solidFill>
-                  <a:schemeClr val="accent1"/>
-                </a:solidFill>
-              </a:ln>
-            </p:spPr>
-            <p:style>
-              <a:lnRef idx="2">
-                <a:schemeClr val="accent1">
-                  <a:shade val="50000"/>
-                </a:schemeClr>
-              </a:lnRef>
-              <a:fillRef idx="1">
-                <a:schemeClr val="accent1"/>
-              </a:fillRef>
-              <a:effectRef idx="0">
-                <a:schemeClr val="accent1"/>
-              </a:effectRef>
-              <a:fontRef idx="minor">
-                <a:schemeClr val="lt1"/>
-              </a:fontRef>
-            </p:style>
-            <p:txBody>
-              <a:bodyPr rtlCol="0" anchor="ctr"/>
-              <a:lstStyle/>
-              <a:p>
-                <a:pPr algn="ctr"/>
-                <a:endParaRPr lang="en-CN"/>
-              </a:p>
-            </p:txBody>
-          </p:sp>
-          <p:sp>
-            <p:nvSpPr>
-              <p:cNvPr id="20" name="Rectangle 19">
-                <a:extLst>
-                  <a:ext uri="{FF2B5EF4-FFF2-40B4-BE49-F238E27FC236}">
-                    <a16:creationId xmlns:a16="http://schemas.microsoft.com/office/drawing/2014/main" id="{FCFF7B65-1E11-EA4D-AD73-7B91EA00950B}"/>
-                  </a:ext>
-                </a:extLst>
-              </p:cNvPr>
-              <p:cNvSpPr/>
-              <p:nvPr/>
-            </p:nvSpPr>
-            <p:spPr>
-              <a:xfrm>
-                <a:off x="2849026" y="804893"/>
-                <a:ext cx="775386" cy="291737"/>
-              </a:xfrm>
-              <a:prstGeom prst="rect">
-                <a:avLst/>
-              </a:prstGeom>
-              <a:noFill/>
-              <a:ln w="19050">
-                <a:solidFill>
-                  <a:schemeClr val="accent2"/>
-                </a:solidFill>
-              </a:ln>
-            </p:spPr>
-            <p:style>
-              <a:lnRef idx="2">
-                <a:schemeClr val="accent1">
-                  <a:shade val="50000"/>
-                </a:schemeClr>
-              </a:lnRef>
-              <a:fillRef idx="1">
-                <a:schemeClr val="accent1"/>
-              </a:fillRef>
-              <a:effectRef idx="0">
-                <a:schemeClr val="accent1"/>
-              </a:effectRef>
-              <a:fontRef idx="minor">
-                <a:schemeClr val="lt1"/>
-              </a:fontRef>
-            </p:style>
-            <p:txBody>
-              <a:bodyPr rtlCol="0" anchor="ctr"/>
-              <a:lstStyle/>
-              <a:p>
-                <a:pPr algn="ctr"/>
-                <a:r>
-                  <a:rPr lang="en-CN" sz="1200" dirty="0">
-                    <a:solidFill>
-                      <a:schemeClr val="accent2">
-                        <a:lumMod val="50000"/>
-                      </a:schemeClr>
-                    </a:solidFill>
-                  </a:rPr>
-                  <a:t>input_</a:t>
-                </a:r>
-                <a:r>
-                  <a:rPr lang="en-US" sz="1200" dirty="0">
-                    <a:solidFill>
-                      <a:schemeClr val="accent2">
-                        <a:lumMod val="50000"/>
-                      </a:schemeClr>
-                    </a:solidFill>
-                  </a:rPr>
-                  <a:t>0</a:t>
-                </a:r>
-                <a:endParaRPr lang="en-CN" sz="1200" dirty="0">
-                  <a:solidFill>
-                    <a:schemeClr val="accent2">
-                      <a:lumMod val="50000"/>
-                    </a:schemeClr>
-                  </a:solidFill>
-                </a:endParaRPr>
-              </a:p>
-            </p:txBody>
-          </p:sp>
-          <p:sp>
-            <p:nvSpPr>
-              <p:cNvPr id="21" name="Rectangle 20">
-                <a:extLst>
-                  <a:ext uri="{FF2B5EF4-FFF2-40B4-BE49-F238E27FC236}">
-                    <a16:creationId xmlns:a16="http://schemas.microsoft.com/office/drawing/2014/main" id="{B29D5AD1-0371-504A-BFF3-16456E8C0793}"/>
-                  </a:ext>
-                </a:extLst>
-              </p:cNvPr>
-              <p:cNvSpPr/>
-              <p:nvPr/>
-            </p:nvSpPr>
-            <p:spPr>
-              <a:xfrm>
-                <a:off x="2849026" y="1213592"/>
-                <a:ext cx="775386" cy="291737"/>
-              </a:xfrm>
-              <a:prstGeom prst="rect">
-                <a:avLst/>
-              </a:prstGeom>
-              <a:noFill/>
-              <a:ln w="19050">
-                <a:solidFill>
-                  <a:schemeClr val="accent2"/>
-                </a:solidFill>
-              </a:ln>
-            </p:spPr>
-            <p:style>
-              <a:lnRef idx="2">
-                <a:schemeClr val="accent1">
-                  <a:shade val="50000"/>
-                </a:schemeClr>
-              </a:lnRef>
-              <a:fillRef idx="1">
-                <a:schemeClr val="accent1"/>
-              </a:fillRef>
-              <a:effectRef idx="0">
-                <a:schemeClr val="accent1"/>
-              </a:effectRef>
-              <a:fontRef idx="minor">
-                <a:schemeClr val="lt1"/>
-              </a:fontRef>
-            </p:style>
-            <p:txBody>
-              <a:bodyPr rtlCol="0" anchor="ctr"/>
-              <a:lstStyle/>
-              <a:p>
-                <a:pPr algn="ctr"/>
-                <a:r>
-                  <a:rPr lang="en-CN" sz="1200" dirty="0">
-                    <a:solidFill>
-                      <a:schemeClr val="accent2">
-                        <a:lumMod val="50000"/>
-                      </a:schemeClr>
-                    </a:solidFill>
-                  </a:rPr>
-                  <a:t>input_</a:t>
-                </a:r>
-                <a:r>
-                  <a:rPr lang="en-US" sz="1200" dirty="0">
-                    <a:solidFill>
-                      <a:schemeClr val="accent2">
-                        <a:lumMod val="50000"/>
-                      </a:schemeClr>
-                    </a:solidFill>
-                  </a:rPr>
-                  <a:t>1</a:t>
-                </a:r>
-                <a:endParaRPr lang="en-CN" sz="1200" dirty="0">
-                  <a:solidFill>
-                    <a:schemeClr val="accent2">
-                      <a:lumMod val="50000"/>
-                    </a:schemeClr>
-                  </a:solidFill>
-                </a:endParaRPr>
-              </a:p>
-            </p:txBody>
-          </p:sp>
-          <p:sp>
-            <p:nvSpPr>
-              <p:cNvPr id="22" name="Rectangle 21">
-                <a:extLst>
-                  <a:ext uri="{FF2B5EF4-FFF2-40B4-BE49-F238E27FC236}">
-                    <a16:creationId xmlns:a16="http://schemas.microsoft.com/office/drawing/2014/main" id="{85F18286-1D82-1240-9F31-8BE199044B12}"/>
-                  </a:ext>
-                </a:extLst>
-              </p:cNvPr>
-              <p:cNvSpPr/>
-              <p:nvPr/>
-            </p:nvSpPr>
-            <p:spPr>
-              <a:xfrm>
-                <a:off x="2849026" y="1622291"/>
-                <a:ext cx="775386" cy="291737"/>
-              </a:xfrm>
-              <a:prstGeom prst="rect">
-                <a:avLst/>
-              </a:prstGeom>
-              <a:noFill/>
-              <a:ln w="19050">
-                <a:solidFill>
-                  <a:schemeClr val="accent2"/>
-                </a:solidFill>
-              </a:ln>
-            </p:spPr>
-            <p:style>
-              <a:lnRef idx="2">
-                <a:schemeClr val="accent1">
-                  <a:shade val="50000"/>
-                </a:schemeClr>
-              </a:lnRef>
-              <a:fillRef idx="1">
-                <a:schemeClr val="accent1"/>
-              </a:fillRef>
-              <a:effectRef idx="0">
-                <a:schemeClr val="accent1"/>
-              </a:effectRef>
-              <a:fontRef idx="minor">
-                <a:schemeClr val="lt1"/>
-              </a:fontRef>
-            </p:style>
-            <p:txBody>
-              <a:bodyPr rtlCol="0" anchor="ctr"/>
-              <a:lstStyle/>
-              <a:p>
-                <a:pPr algn="ctr"/>
-                <a:r>
-                  <a:rPr lang="en-CN" sz="1200" dirty="0">
-                    <a:solidFill>
-                      <a:schemeClr val="accent2">
-                        <a:lumMod val="50000"/>
-                      </a:schemeClr>
-                    </a:solidFill>
-                  </a:rPr>
-                  <a:t>input</a:t>
-                </a:r>
-                <a:r>
-                  <a:rPr lang="en-US" sz="1200" dirty="0">
-                    <a:solidFill>
-                      <a:schemeClr val="accent2">
-                        <a:lumMod val="50000"/>
-                      </a:schemeClr>
-                    </a:solidFill>
-                  </a:rPr>
-                  <a:t>_n</a:t>
-                </a:r>
-                <a:endParaRPr lang="en-CN" sz="1200" dirty="0">
-                  <a:solidFill>
-                    <a:schemeClr val="accent2">
-                      <a:lumMod val="50000"/>
-                    </a:schemeClr>
-                  </a:solidFill>
-                </a:endParaRPr>
-              </a:p>
-            </p:txBody>
-          </p:sp>
-          <p:sp>
-            <p:nvSpPr>
-              <p:cNvPr id="27" name="Rectangle 26">
-                <a:extLst>
-                  <a:ext uri="{FF2B5EF4-FFF2-40B4-BE49-F238E27FC236}">
-                    <a16:creationId xmlns:a16="http://schemas.microsoft.com/office/drawing/2014/main" id="{C9F131F4-9BA5-EA40-9B14-088B2EEB9C6B}"/>
-                  </a:ext>
-                </a:extLst>
-              </p:cNvPr>
-              <p:cNvSpPr/>
-              <p:nvPr/>
-            </p:nvSpPr>
-            <p:spPr>
-              <a:xfrm>
-                <a:off x="2849026" y="2356730"/>
-                <a:ext cx="775386" cy="291737"/>
-              </a:xfrm>
-              <a:prstGeom prst="rect">
-                <a:avLst/>
-              </a:prstGeom>
-              <a:noFill/>
-              <a:ln w="19050">
-                <a:solidFill>
-                  <a:schemeClr val="accent1"/>
-                </a:solidFill>
-              </a:ln>
-            </p:spPr>
-            <p:style>
-              <a:lnRef idx="2">
-                <a:schemeClr val="accent1">
-                  <a:shade val="50000"/>
-                </a:schemeClr>
-              </a:lnRef>
-              <a:fillRef idx="1">
-                <a:schemeClr val="accent1"/>
-              </a:fillRef>
-              <a:effectRef idx="0">
-                <a:schemeClr val="accent1"/>
-              </a:effectRef>
-              <a:fontRef idx="minor">
-                <a:schemeClr val="lt1"/>
-              </a:fontRef>
-            </p:style>
-            <p:txBody>
-              <a:bodyPr rtlCol="0" anchor="ctr"/>
-              <a:lstStyle/>
-              <a:p>
-                <a:pPr algn="ctr"/>
-                <a:r>
-                  <a:rPr lang="en-CN" sz="1200" dirty="0">
-                    <a:solidFill>
-                      <a:schemeClr val="accent1">
-                        <a:lumMod val="50000"/>
-                      </a:schemeClr>
-                    </a:solidFill>
-                  </a:rPr>
-                  <a:t>output_</a:t>
-                </a:r>
-                <a:r>
-                  <a:rPr lang="en-US" sz="1200" dirty="0">
-                    <a:solidFill>
-                      <a:schemeClr val="accent1">
-                        <a:lumMod val="50000"/>
-                      </a:schemeClr>
-                    </a:solidFill>
-                  </a:rPr>
-                  <a:t>0</a:t>
-                </a:r>
-                <a:endParaRPr lang="en-CN" sz="1200" dirty="0">
-                  <a:solidFill>
-                    <a:schemeClr val="accent1">
-                      <a:lumMod val="50000"/>
-                    </a:schemeClr>
-                  </a:solidFill>
-                </a:endParaRPr>
-              </a:p>
-            </p:txBody>
-          </p:sp>
-          <p:sp>
-            <p:nvSpPr>
-              <p:cNvPr id="28" name="Rectangle 27">
-                <a:extLst>
-                  <a:ext uri="{FF2B5EF4-FFF2-40B4-BE49-F238E27FC236}">
-                    <a16:creationId xmlns:a16="http://schemas.microsoft.com/office/drawing/2014/main" id="{E626FE29-C3B2-B245-992E-4BA66B72094F}"/>
-                  </a:ext>
-                </a:extLst>
-              </p:cNvPr>
-              <p:cNvSpPr/>
-              <p:nvPr/>
-            </p:nvSpPr>
-            <p:spPr>
-              <a:xfrm>
-                <a:off x="2849026" y="2765429"/>
-                <a:ext cx="775386" cy="291737"/>
-              </a:xfrm>
-              <a:prstGeom prst="rect">
-                <a:avLst/>
-              </a:prstGeom>
-              <a:noFill/>
-              <a:ln w="19050">
-                <a:solidFill>
-                  <a:schemeClr val="accent1"/>
-                </a:solidFill>
-              </a:ln>
-            </p:spPr>
-            <p:style>
-              <a:lnRef idx="2">
-                <a:schemeClr val="accent1">
-                  <a:shade val="50000"/>
-                </a:schemeClr>
-              </a:lnRef>
-              <a:fillRef idx="1">
-                <a:schemeClr val="accent1"/>
-              </a:fillRef>
-              <a:effectRef idx="0">
-                <a:schemeClr val="accent1"/>
-              </a:effectRef>
-              <a:fontRef idx="minor">
-                <a:schemeClr val="lt1"/>
-              </a:fontRef>
-            </p:style>
-            <p:txBody>
-              <a:bodyPr rtlCol="0" anchor="ctr"/>
-              <a:lstStyle/>
-              <a:p>
-                <a:pPr algn="ctr"/>
-                <a:r>
-                  <a:rPr lang="en-CN" sz="1200" dirty="0">
-                    <a:solidFill>
-                      <a:schemeClr val="accent1">
-                        <a:lumMod val="50000"/>
-                      </a:schemeClr>
-                    </a:solidFill>
-                  </a:rPr>
-                  <a:t>output_</a:t>
-                </a:r>
-                <a:r>
-                  <a:rPr lang="en-US" sz="1200" dirty="0">
-                    <a:solidFill>
-                      <a:schemeClr val="accent1">
-                        <a:lumMod val="50000"/>
-                      </a:schemeClr>
-                    </a:solidFill>
-                  </a:rPr>
-                  <a:t>1</a:t>
-                </a:r>
-                <a:endParaRPr lang="en-CN" sz="1200" dirty="0">
-                  <a:solidFill>
-                    <a:schemeClr val="accent1">
-                      <a:lumMod val="50000"/>
-                    </a:schemeClr>
-                  </a:solidFill>
-                </a:endParaRPr>
-              </a:p>
-            </p:txBody>
-          </p:sp>
-          <p:sp>
-            <p:nvSpPr>
-              <p:cNvPr id="29" name="Rectangle 28">
-                <a:extLst>
-                  <a:ext uri="{FF2B5EF4-FFF2-40B4-BE49-F238E27FC236}">
-                    <a16:creationId xmlns:a16="http://schemas.microsoft.com/office/drawing/2014/main" id="{1EDFD9B7-0CFA-5942-9BA4-28594222EFAA}"/>
-                  </a:ext>
-                </a:extLst>
-              </p:cNvPr>
-              <p:cNvSpPr/>
-              <p:nvPr/>
-            </p:nvSpPr>
-            <p:spPr>
-              <a:xfrm>
-                <a:off x="2849026" y="3174128"/>
-                <a:ext cx="775386" cy="291737"/>
-              </a:xfrm>
-              <a:prstGeom prst="rect">
-                <a:avLst/>
-              </a:prstGeom>
-              <a:noFill/>
-              <a:ln w="19050">
-                <a:solidFill>
-                  <a:schemeClr val="accent1"/>
-                </a:solidFill>
-              </a:ln>
-            </p:spPr>
-            <p:style>
-              <a:lnRef idx="2">
-                <a:schemeClr val="accent1">
-                  <a:shade val="50000"/>
-                </a:schemeClr>
-              </a:lnRef>
-              <a:fillRef idx="1">
-                <a:schemeClr val="accent1"/>
-              </a:fillRef>
-              <a:effectRef idx="0">
-                <a:schemeClr val="accent1"/>
-              </a:effectRef>
-              <a:fontRef idx="minor">
-                <a:schemeClr val="lt1"/>
-              </a:fontRef>
-            </p:style>
-            <p:txBody>
-              <a:bodyPr rtlCol="0" anchor="ctr"/>
-              <a:lstStyle/>
-              <a:p>
-                <a:pPr algn="ctr"/>
-                <a:r>
-                  <a:rPr lang="en-CN" sz="1200" dirty="0">
-                    <a:solidFill>
-                      <a:schemeClr val="accent1">
-                        <a:lumMod val="50000"/>
-                      </a:schemeClr>
-                    </a:solidFill>
-                  </a:rPr>
-                  <a:t>output</a:t>
-                </a:r>
-                <a:r>
-                  <a:rPr lang="en-US" sz="1200" dirty="0">
-                    <a:solidFill>
-                      <a:schemeClr val="accent1">
-                        <a:lumMod val="50000"/>
-                      </a:schemeClr>
-                    </a:solidFill>
-                  </a:rPr>
-                  <a:t>_n</a:t>
-                </a:r>
-                <a:endParaRPr lang="en-CN" sz="1200" dirty="0">
-                  <a:solidFill>
-                    <a:schemeClr val="accent1">
-                      <a:lumMod val="50000"/>
-                    </a:schemeClr>
-                  </a:solidFill>
-                </a:endParaRPr>
-              </a:p>
-            </p:txBody>
-          </p:sp>
-          <p:sp>
-            <p:nvSpPr>
-              <p:cNvPr id="41" name="TextBox 40">
-                <a:extLst>
-                  <a:ext uri="{FF2B5EF4-FFF2-40B4-BE49-F238E27FC236}">
-                    <a16:creationId xmlns:a16="http://schemas.microsoft.com/office/drawing/2014/main" id="{7B3D1BE0-CF63-654C-8245-E74DF6F92B92}"/>
-                  </a:ext>
-                </a:extLst>
-              </p:cNvPr>
-              <p:cNvSpPr txBox="1"/>
-              <p:nvPr/>
-            </p:nvSpPr>
-            <p:spPr>
-              <a:xfrm>
-                <a:off x="6404248" y="3833090"/>
-                <a:ext cx="1319645" cy="369332"/>
-              </a:xfrm>
-              <a:prstGeom prst="rect">
-                <a:avLst/>
-              </a:prstGeom>
-              <a:noFill/>
-            </p:spPr>
-            <p:txBody>
-              <a:bodyPr wrap="square" rtlCol="0">
-                <a:spAutoFit/>
-              </a:bodyPr>
-              <a:lstStyle/>
-              <a:p>
-                <a:pPr algn="ctr"/>
-                <a:r>
-                  <a:rPr lang="en-CN" b="1" dirty="0">
-                    <a:latin typeface="Times New Roman" panose="02020603050405020304" pitchFamily="18" charset="0"/>
-                    <a:cs typeface="Times New Roman" panose="02020603050405020304" pitchFamily="18" charset="0"/>
-                  </a:rPr>
-                  <a:t>TX 2</a:t>
-                </a:r>
-              </a:p>
-            </p:txBody>
-          </p:sp>
-          <p:cxnSp>
-            <p:nvCxnSpPr>
-              <p:cNvPr id="42" name="Straight Connector 41">
-                <a:extLst>
-                  <a:ext uri="{FF2B5EF4-FFF2-40B4-BE49-F238E27FC236}">
-                    <a16:creationId xmlns:a16="http://schemas.microsoft.com/office/drawing/2014/main" id="{A9DEB1A5-E7AF-7748-8B95-25730A80FF17}"/>
-                  </a:ext>
-                </a:extLst>
-              </p:cNvPr>
-              <p:cNvCxnSpPr/>
-              <p:nvPr/>
-            </p:nvCxnSpPr>
-            <p:spPr>
-              <a:xfrm>
-                <a:off x="6404248" y="466723"/>
-                <a:ext cx="1319645" cy="0"/>
-              </a:xfrm>
-              <a:prstGeom prst="line">
-                <a:avLst/>
-              </a:prstGeom>
-              <a:ln w="19050">
-                <a:solidFill>
-                  <a:schemeClr val="tx1"/>
-                </a:solidFill>
-              </a:ln>
-            </p:spPr>
-            <p:style>
-              <a:lnRef idx="1">
-                <a:schemeClr val="accent1"/>
-              </a:lnRef>
-              <a:fillRef idx="0">
-                <a:schemeClr val="accent1"/>
-              </a:fillRef>
-              <a:effectRef idx="0">
-                <a:schemeClr val="accent1"/>
-              </a:effectRef>
-              <a:fontRef idx="minor">
-                <a:schemeClr val="tx1"/>
-              </a:fontRef>
-            </p:style>
-          </p:cxnSp>
-          <p:sp>
-            <p:nvSpPr>
-              <p:cNvPr id="43" name="Rounded Rectangle 42">
-                <a:extLst>
-                  <a:ext uri="{FF2B5EF4-FFF2-40B4-BE49-F238E27FC236}">
-                    <a16:creationId xmlns:a16="http://schemas.microsoft.com/office/drawing/2014/main" id="{E86EC7F5-9F24-3048-862E-FD7711E64790}"/>
-                  </a:ext>
-                </a:extLst>
-              </p:cNvPr>
-              <p:cNvSpPr/>
-              <p:nvPr/>
-            </p:nvSpPr>
-            <p:spPr>
-              <a:xfrm>
-                <a:off x="6404248" y="154711"/>
-                <a:ext cx="1319645" cy="3678381"/>
-              </a:xfrm>
-              <a:prstGeom prst="roundRect">
-                <a:avLst>
-                  <a:gd name="adj" fmla="val 6838"/>
-                </a:avLst>
-              </a:prstGeom>
-              <a:noFill/>
-              <a:ln w="19050">
-                <a:solidFill>
-                  <a:schemeClr val="tx1"/>
-                </a:solidFill>
-              </a:ln>
-            </p:spPr>
-            <p:style>
-              <a:lnRef idx="2">
-                <a:schemeClr val="accent1">
-                  <a:shade val="50000"/>
-                </a:schemeClr>
-              </a:lnRef>
-              <a:fillRef idx="1">
-                <a:schemeClr val="accent1"/>
-              </a:fillRef>
-              <a:effectRef idx="0">
-                <a:schemeClr val="accent1"/>
-              </a:effectRef>
-              <a:fontRef idx="minor">
-                <a:schemeClr val="lt1"/>
-              </a:fontRef>
-            </p:style>
-            <p:txBody>
-              <a:bodyPr rtlCol="0" anchor="ctr"/>
-              <a:lstStyle/>
-              <a:p>
-                <a:pPr algn="ctr"/>
-                <a:endParaRPr lang="en-CN">
-                  <a:latin typeface="Times New Roman" panose="02020603050405020304" pitchFamily="18" charset="0"/>
-                  <a:cs typeface="Times New Roman" panose="02020603050405020304" pitchFamily="18" charset="0"/>
-                </a:endParaRPr>
-              </a:p>
-            </p:txBody>
-          </p:sp>
-          <p:sp>
-            <p:nvSpPr>
-              <p:cNvPr id="44" name="TextBox 43">
-                <a:extLst>
-                  <a:ext uri="{FF2B5EF4-FFF2-40B4-BE49-F238E27FC236}">
-                    <a16:creationId xmlns:a16="http://schemas.microsoft.com/office/drawing/2014/main" id="{DB5F870E-A853-3B41-9901-2036E09E1252}"/>
-                  </a:ext>
-                </a:extLst>
-              </p:cNvPr>
-              <p:cNvSpPr txBox="1"/>
-              <p:nvPr/>
-            </p:nvSpPr>
-            <p:spPr>
-              <a:xfrm>
-                <a:off x="6404248" y="154709"/>
-                <a:ext cx="1319645" cy="323165"/>
-              </a:xfrm>
-              <a:prstGeom prst="rect">
-                <a:avLst/>
-              </a:prstGeom>
-              <a:noFill/>
-            </p:spPr>
-            <p:txBody>
-              <a:bodyPr wrap="square" rtlCol="0">
-                <a:spAutoFit/>
-              </a:bodyPr>
-              <a:lstStyle/>
-              <a:p>
-                <a:pPr algn="ctr"/>
-                <a:r>
-                  <a:rPr lang="en-US" sz="1500" dirty="0"/>
-                  <a:t>h</a:t>
-                </a:r>
-                <a:r>
-                  <a:rPr lang="en-US" sz="1500" dirty="0">
-                    <a:effectLst/>
-                  </a:rPr>
-                  <a:t>ash_2</a:t>
-                </a:r>
-              </a:p>
-            </p:txBody>
-          </p:sp>
-          <p:sp>
-            <p:nvSpPr>
-              <p:cNvPr id="45" name="Rectangle 44">
-                <a:extLst>
-                  <a:ext uri="{FF2B5EF4-FFF2-40B4-BE49-F238E27FC236}">
-                    <a16:creationId xmlns:a16="http://schemas.microsoft.com/office/drawing/2014/main" id="{E83CF83E-A8AB-824E-9ED4-CC27F7C4B1F0}"/>
-                  </a:ext>
-                </a:extLst>
-              </p:cNvPr>
-              <p:cNvSpPr/>
-              <p:nvPr/>
-            </p:nvSpPr>
-            <p:spPr>
-              <a:xfrm>
-                <a:off x="6590142" y="729417"/>
-                <a:ext cx="947853" cy="1260087"/>
-              </a:xfrm>
-              <a:prstGeom prst="rect">
-                <a:avLst/>
-              </a:prstGeom>
-              <a:noFill/>
-              <a:ln w="19050">
-                <a:solidFill>
-                  <a:schemeClr val="accent2"/>
-                </a:solidFill>
-              </a:ln>
-            </p:spPr>
-            <p:style>
-              <a:lnRef idx="2">
-                <a:schemeClr val="accent1">
-                  <a:shade val="50000"/>
-                </a:schemeClr>
-              </a:lnRef>
-              <a:fillRef idx="1">
-                <a:schemeClr val="accent1"/>
-              </a:fillRef>
-              <a:effectRef idx="0">
-                <a:schemeClr val="accent1"/>
-              </a:effectRef>
-              <a:fontRef idx="minor">
-                <a:schemeClr val="lt1"/>
-              </a:fontRef>
-            </p:style>
-            <p:txBody>
-              <a:bodyPr rtlCol="0" anchor="ctr"/>
-              <a:lstStyle/>
-              <a:p>
-                <a:pPr algn="ctr"/>
-                <a:endParaRPr lang="en-CN">
-                  <a:solidFill>
-                    <a:schemeClr val="accent2">
-                      <a:lumMod val="50000"/>
-                    </a:schemeClr>
-                  </a:solidFill>
-                </a:endParaRPr>
-              </a:p>
-            </p:txBody>
-          </p:sp>
-          <p:sp>
-            <p:nvSpPr>
-              <p:cNvPr id="46" name="Rectangle 45">
-                <a:extLst>
-                  <a:ext uri="{FF2B5EF4-FFF2-40B4-BE49-F238E27FC236}">
-                    <a16:creationId xmlns:a16="http://schemas.microsoft.com/office/drawing/2014/main" id="{6A09A708-2334-9940-AE71-FDA52C47110C}"/>
-                  </a:ext>
-                </a:extLst>
-              </p:cNvPr>
-              <p:cNvSpPr/>
-              <p:nvPr/>
-            </p:nvSpPr>
-            <p:spPr>
-              <a:xfrm>
-                <a:off x="6590142" y="2278578"/>
-                <a:ext cx="947853" cy="1260087"/>
-              </a:xfrm>
-              <a:prstGeom prst="rect">
-                <a:avLst/>
-              </a:prstGeom>
-              <a:noFill/>
-              <a:ln w="19050">
-                <a:solidFill>
-                  <a:schemeClr val="accent1"/>
-                </a:solidFill>
-              </a:ln>
-            </p:spPr>
-            <p:style>
-              <a:lnRef idx="2">
-                <a:schemeClr val="accent1">
-                  <a:shade val="50000"/>
-                </a:schemeClr>
-              </a:lnRef>
-              <a:fillRef idx="1">
-                <a:schemeClr val="accent1"/>
-              </a:fillRef>
-              <a:effectRef idx="0">
-                <a:schemeClr val="accent1"/>
-              </a:effectRef>
-              <a:fontRef idx="minor">
-                <a:schemeClr val="lt1"/>
-              </a:fontRef>
-            </p:style>
-            <p:txBody>
-              <a:bodyPr rtlCol="0" anchor="ctr"/>
-              <a:lstStyle/>
-              <a:p>
-                <a:pPr algn="ctr"/>
-                <a:endParaRPr lang="en-CN"/>
-              </a:p>
-            </p:txBody>
-          </p:sp>
-          <p:sp>
-            <p:nvSpPr>
-              <p:cNvPr id="47" name="Rectangle 46">
-                <a:extLst>
-                  <a:ext uri="{FF2B5EF4-FFF2-40B4-BE49-F238E27FC236}">
-                    <a16:creationId xmlns:a16="http://schemas.microsoft.com/office/drawing/2014/main" id="{39068306-9C95-9645-B0C5-09DA4632C20F}"/>
-                  </a:ext>
-                </a:extLst>
-              </p:cNvPr>
-              <p:cNvSpPr/>
-              <p:nvPr/>
-            </p:nvSpPr>
-            <p:spPr>
-              <a:xfrm>
-                <a:off x="6676375" y="804893"/>
-                <a:ext cx="775386" cy="291737"/>
-              </a:xfrm>
-              <a:prstGeom prst="rect">
-                <a:avLst/>
-              </a:prstGeom>
-              <a:noFill/>
-              <a:ln w="19050">
-                <a:solidFill>
-                  <a:schemeClr val="accent2"/>
-                </a:solidFill>
-              </a:ln>
-            </p:spPr>
-            <p:style>
-              <a:lnRef idx="2">
-                <a:schemeClr val="accent1">
-                  <a:shade val="50000"/>
-                </a:schemeClr>
-              </a:lnRef>
-              <a:fillRef idx="1">
-                <a:schemeClr val="accent1"/>
-              </a:fillRef>
-              <a:effectRef idx="0">
-                <a:schemeClr val="accent1"/>
-              </a:effectRef>
-              <a:fontRef idx="minor">
-                <a:schemeClr val="lt1"/>
-              </a:fontRef>
-            </p:style>
-            <p:txBody>
-              <a:bodyPr rtlCol="0" anchor="ctr"/>
-              <a:lstStyle/>
-              <a:p>
-                <a:pPr algn="ctr"/>
-                <a:r>
-                  <a:rPr lang="en-CN" sz="1200" dirty="0">
-                    <a:solidFill>
-                      <a:schemeClr val="accent2">
-                        <a:lumMod val="50000"/>
-                      </a:schemeClr>
-                    </a:solidFill>
-                  </a:rPr>
-                  <a:t>input_</a:t>
-                </a:r>
-                <a:r>
-                  <a:rPr lang="en-US" sz="1200" dirty="0">
-                    <a:solidFill>
-                      <a:schemeClr val="accent2">
-                        <a:lumMod val="50000"/>
-                      </a:schemeClr>
-                    </a:solidFill>
-                  </a:rPr>
-                  <a:t>0</a:t>
-                </a:r>
-                <a:endParaRPr lang="en-CN" sz="1200" dirty="0">
-                  <a:solidFill>
-                    <a:schemeClr val="accent2">
-                      <a:lumMod val="50000"/>
-                    </a:schemeClr>
-                  </a:solidFill>
-                </a:endParaRPr>
-              </a:p>
-            </p:txBody>
-          </p:sp>
-          <p:sp>
-            <p:nvSpPr>
-              <p:cNvPr id="48" name="Rectangle 47">
-                <a:extLst>
-                  <a:ext uri="{FF2B5EF4-FFF2-40B4-BE49-F238E27FC236}">
-                    <a16:creationId xmlns:a16="http://schemas.microsoft.com/office/drawing/2014/main" id="{8F6832C2-D70C-1C45-ADAF-B768C3E732B5}"/>
-                  </a:ext>
-                </a:extLst>
-              </p:cNvPr>
-              <p:cNvSpPr/>
-              <p:nvPr/>
-            </p:nvSpPr>
-            <p:spPr>
-              <a:xfrm>
-                <a:off x="6676375" y="1213592"/>
-                <a:ext cx="775386" cy="291737"/>
-              </a:xfrm>
-              <a:prstGeom prst="rect">
-                <a:avLst/>
-              </a:prstGeom>
-              <a:noFill/>
-              <a:ln w="19050">
-                <a:solidFill>
-                  <a:schemeClr val="accent2"/>
-                </a:solidFill>
-              </a:ln>
-            </p:spPr>
-            <p:style>
-              <a:lnRef idx="2">
-                <a:schemeClr val="accent1">
-                  <a:shade val="50000"/>
-                </a:schemeClr>
-              </a:lnRef>
-              <a:fillRef idx="1">
-                <a:schemeClr val="accent1"/>
-              </a:fillRef>
-              <a:effectRef idx="0">
-                <a:schemeClr val="accent1"/>
-              </a:effectRef>
-              <a:fontRef idx="minor">
-                <a:schemeClr val="lt1"/>
-              </a:fontRef>
-            </p:style>
-            <p:txBody>
-              <a:bodyPr rtlCol="0" anchor="ctr"/>
-              <a:lstStyle/>
-              <a:p>
-                <a:pPr algn="ctr"/>
-                <a:r>
-                  <a:rPr lang="en-CN" sz="1200" dirty="0">
-                    <a:solidFill>
-                      <a:schemeClr val="accent2">
-                        <a:lumMod val="50000"/>
-                      </a:schemeClr>
-                    </a:solidFill>
-                  </a:rPr>
-                  <a:t>input_</a:t>
-                </a:r>
-                <a:r>
-                  <a:rPr lang="en-US" sz="1200" dirty="0">
-                    <a:solidFill>
-                      <a:schemeClr val="accent2">
-                        <a:lumMod val="50000"/>
-                      </a:schemeClr>
-                    </a:solidFill>
-                  </a:rPr>
-                  <a:t>1</a:t>
-                </a:r>
-                <a:endParaRPr lang="en-CN" sz="1200" dirty="0">
-                  <a:solidFill>
-                    <a:schemeClr val="accent2">
-                      <a:lumMod val="50000"/>
-                    </a:schemeClr>
-                  </a:solidFill>
-                </a:endParaRPr>
-              </a:p>
-            </p:txBody>
-          </p:sp>
-          <p:sp>
-            <p:nvSpPr>
-              <p:cNvPr id="50" name="Rectangle 49">
-                <a:extLst>
-                  <a:ext uri="{FF2B5EF4-FFF2-40B4-BE49-F238E27FC236}">
-                    <a16:creationId xmlns:a16="http://schemas.microsoft.com/office/drawing/2014/main" id="{61E035E7-E472-F24F-BC65-122A1606152C}"/>
-                  </a:ext>
-                </a:extLst>
-              </p:cNvPr>
-              <p:cNvSpPr/>
-              <p:nvPr/>
-            </p:nvSpPr>
-            <p:spPr>
-              <a:xfrm>
-                <a:off x="6676375" y="2356730"/>
-                <a:ext cx="775386" cy="291737"/>
-              </a:xfrm>
-              <a:prstGeom prst="rect">
-                <a:avLst/>
-              </a:prstGeom>
-              <a:noFill/>
-              <a:ln w="19050">
-                <a:solidFill>
-                  <a:schemeClr val="accent1"/>
-                </a:solidFill>
-              </a:ln>
-            </p:spPr>
-            <p:style>
-              <a:lnRef idx="2">
-                <a:schemeClr val="accent1">
-                  <a:shade val="50000"/>
-                </a:schemeClr>
-              </a:lnRef>
-              <a:fillRef idx="1">
-                <a:schemeClr val="accent1"/>
-              </a:fillRef>
-              <a:effectRef idx="0">
-                <a:schemeClr val="accent1"/>
-              </a:effectRef>
-              <a:fontRef idx="minor">
-                <a:schemeClr val="lt1"/>
-              </a:fontRef>
-            </p:style>
-            <p:txBody>
-              <a:bodyPr rtlCol="0" anchor="ctr"/>
-              <a:lstStyle/>
-              <a:p>
-                <a:pPr algn="ctr"/>
-                <a:r>
-                  <a:rPr lang="en-CN" sz="1200" dirty="0">
-                    <a:solidFill>
-                      <a:schemeClr val="accent1">
-                        <a:lumMod val="50000"/>
-                      </a:schemeClr>
-                    </a:solidFill>
-                  </a:rPr>
-                  <a:t>output_</a:t>
-                </a:r>
-                <a:r>
-                  <a:rPr lang="en-US" sz="1200" dirty="0">
-                    <a:solidFill>
-                      <a:schemeClr val="accent1">
-                        <a:lumMod val="50000"/>
-                      </a:schemeClr>
-                    </a:solidFill>
-                  </a:rPr>
-                  <a:t>0</a:t>
-                </a:r>
-                <a:endParaRPr lang="en-CN" sz="1200" dirty="0">
-                  <a:solidFill>
-                    <a:schemeClr val="accent1">
-                      <a:lumMod val="50000"/>
-                    </a:schemeClr>
-                  </a:solidFill>
-                </a:endParaRPr>
-              </a:p>
-            </p:txBody>
-          </p:sp>
-          <p:sp>
-            <p:nvSpPr>
-              <p:cNvPr id="51" name="Rectangle 50">
-                <a:extLst>
-                  <a:ext uri="{FF2B5EF4-FFF2-40B4-BE49-F238E27FC236}">
-                    <a16:creationId xmlns:a16="http://schemas.microsoft.com/office/drawing/2014/main" id="{F217FD9D-B695-8F4C-87F1-A235B5399E81}"/>
-                  </a:ext>
-                </a:extLst>
-              </p:cNvPr>
-              <p:cNvSpPr/>
-              <p:nvPr/>
-            </p:nvSpPr>
-            <p:spPr>
-              <a:xfrm>
-                <a:off x="6676375" y="2765429"/>
-                <a:ext cx="775386" cy="291737"/>
-              </a:xfrm>
-              <a:prstGeom prst="rect">
-                <a:avLst/>
-              </a:prstGeom>
-              <a:noFill/>
-              <a:ln w="19050">
-                <a:solidFill>
-                  <a:schemeClr val="accent1"/>
-                </a:solidFill>
-              </a:ln>
-            </p:spPr>
-            <p:style>
-              <a:lnRef idx="2">
-                <a:schemeClr val="accent1">
-                  <a:shade val="50000"/>
-                </a:schemeClr>
-              </a:lnRef>
-              <a:fillRef idx="1">
-                <a:schemeClr val="accent1"/>
-              </a:fillRef>
-              <a:effectRef idx="0">
-                <a:schemeClr val="accent1"/>
-              </a:effectRef>
-              <a:fontRef idx="minor">
-                <a:schemeClr val="lt1"/>
-              </a:fontRef>
-            </p:style>
-            <p:txBody>
-              <a:bodyPr rtlCol="0" anchor="ctr"/>
-              <a:lstStyle/>
-              <a:p>
-                <a:pPr algn="ctr"/>
-                <a:r>
-                  <a:rPr lang="en-CN" sz="1200" dirty="0">
-                    <a:solidFill>
-                      <a:schemeClr val="accent1">
-                        <a:lumMod val="50000"/>
-                      </a:schemeClr>
-                    </a:solidFill>
-                  </a:rPr>
-                  <a:t>output_</a:t>
-                </a:r>
-                <a:r>
-                  <a:rPr lang="en-US" sz="1200" dirty="0">
-                    <a:solidFill>
-                      <a:schemeClr val="accent1">
-                        <a:lumMod val="50000"/>
-                      </a:schemeClr>
-                    </a:solidFill>
-                  </a:rPr>
-                  <a:t>1</a:t>
-                </a:r>
-                <a:endParaRPr lang="en-CN" sz="1200" dirty="0">
-                  <a:solidFill>
-                    <a:schemeClr val="accent1">
-                      <a:lumMod val="50000"/>
-                    </a:schemeClr>
-                  </a:solidFill>
-                </a:endParaRPr>
-              </a:p>
-            </p:txBody>
-          </p:sp>
-          <p:cxnSp>
-            <p:nvCxnSpPr>
-              <p:cNvPr id="37" name="Elbow Connector 36">
-                <a:extLst>
-                  <a:ext uri="{FF2B5EF4-FFF2-40B4-BE49-F238E27FC236}">
-                    <a16:creationId xmlns:a16="http://schemas.microsoft.com/office/drawing/2014/main" id="{1D3822AB-5FA2-9F43-9823-EE1837E75F83}"/>
-                  </a:ext>
-                </a:extLst>
-              </p:cNvPr>
-              <p:cNvCxnSpPr>
-                <a:cxnSpLocks/>
-                <a:stCxn id="102" idx="3"/>
-                <a:endCxn id="48" idx="1"/>
-              </p:cNvCxnSpPr>
-              <p:nvPr/>
-            </p:nvCxnSpPr>
-            <p:spPr>
-              <a:xfrm flipV="1">
-                <a:off x="5788895" y="1359461"/>
-                <a:ext cx="887480" cy="1551871"/>
-              </a:xfrm>
-              <a:prstGeom prst="bentConnector3">
-                <a:avLst>
-                  <a:gd name="adj1" fmla="val 50000"/>
-                </a:avLst>
-              </a:prstGeom>
-              <a:ln w="12700">
-                <a:solidFill>
-                  <a:schemeClr val="tx1"/>
-                </a:solidFill>
-                <a:tailEnd type="stealth" w="lg" len="lg"/>
-              </a:ln>
-            </p:spPr>
-            <p:style>
-              <a:lnRef idx="1">
-                <a:schemeClr val="accent1"/>
-              </a:lnRef>
-              <a:fillRef idx="0">
-                <a:schemeClr val="accent1"/>
-              </a:fillRef>
-              <a:effectRef idx="0">
-                <a:schemeClr val="accent1"/>
-              </a:effectRef>
-              <a:fontRef idx="minor">
-                <a:schemeClr val="tx1"/>
-              </a:fontRef>
-            </p:style>
-          </p:cxnSp>
-          <p:cxnSp>
-            <p:nvCxnSpPr>
-              <p:cNvPr id="56" name="Straight Arrow Connector 55">
-                <a:extLst>
-                  <a:ext uri="{FF2B5EF4-FFF2-40B4-BE49-F238E27FC236}">
-                    <a16:creationId xmlns:a16="http://schemas.microsoft.com/office/drawing/2014/main" id="{263F9595-391D-4646-9774-5382D9E62DD0}"/>
-                  </a:ext>
-                </a:extLst>
-              </p:cNvPr>
-              <p:cNvCxnSpPr>
-                <a:cxnSpLocks/>
-                <a:stCxn id="48" idx="3"/>
-                <a:endCxn id="57" idx="1"/>
-              </p:cNvCxnSpPr>
-              <p:nvPr/>
-            </p:nvCxnSpPr>
-            <p:spPr>
-              <a:xfrm flipV="1">
-                <a:off x="7451761" y="1359460"/>
-                <a:ext cx="540328" cy="1"/>
-              </a:xfrm>
-              <a:prstGeom prst="straightConnector1">
-                <a:avLst/>
-              </a:prstGeom>
-              <a:ln w="12700">
-                <a:solidFill>
-                  <a:schemeClr val="accent2"/>
-                </a:solidFill>
-                <a:prstDash val="sysDash"/>
-                <a:tailEnd type="stealth" w="lg" len="lg"/>
-              </a:ln>
-            </p:spPr>
-            <p:style>
-              <a:lnRef idx="1">
-                <a:schemeClr val="accent1"/>
-              </a:lnRef>
-              <a:fillRef idx="0">
-                <a:schemeClr val="accent1"/>
-              </a:fillRef>
-              <a:effectRef idx="0">
-                <a:schemeClr val="accent1"/>
-              </a:effectRef>
-              <a:fontRef idx="minor">
-                <a:schemeClr val="tx1"/>
-              </a:fontRef>
-            </p:style>
-          </p:cxnSp>
-          <p:sp>
-            <p:nvSpPr>
-              <p:cNvPr id="57" name="Rectangle 56">
-                <a:extLst>
-                  <a:ext uri="{FF2B5EF4-FFF2-40B4-BE49-F238E27FC236}">
-                    <a16:creationId xmlns:a16="http://schemas.microsoft.com/office/drawing/2014/main" id="{C8DC3330-54F3-A84B-AAE3-4BA879B641CA}"/>
-                  </a:ext>
-                </a:extLst>
-              </p:cNvPr>
-              <p:cNvSpPr/>
-              <p:nvPr/>
-            </p:nvSpPr>
-            <p:spPr>
-              <a:xfrm>
-                <a:off x="7992089" y="1026875"/>
-                <a:ext cx="1643861" cy="665170"/>
-              </a:xfrm>
-              <a:prstGeom prst="rect">
-                <a:avLst/>
-              </a:prstGeom>
-              <a:noFill/>
-              <a:ln w="19050">
-                <a:solidFill>
-                  <a:schemeClr val="accent2"/>
-                </a:solidFill>
-                <a:prstDash val="sysDash"/>
-              </a:ln>
-            </p:spPr>
-            <p:style>
-              <a:lnRef idx="2">
-                <a:schemeClr val="accent1">
-                  <a:shade val="50000"/>
-                </a:schemeClr>
-              </a:lnRef>
-              <a:fillRef idx="1">
-                <a:schemeClr val="accent1"/>
-              </a:fillRef>
-              <a:effectRef idx="0">
-                <a:schemeClr val="accent1"/>
-              </a:effectRef>
-              <a:fontRef idx="minor">
-                <a:schemeClr val="lt1"/>
-              </a:fontRef>
-            </p:style>
-            <p:txBody>
-              <a:bodyPr rtlCol="0" anchor="ctr"/>
-              <a:lstStyle/>
-              <a:p>
-                <a:pPr algn="ctr"/>
-                <a:r>
-                  <a:rPr lang="en-US" sz="1200" b="1" u="sng" dirty="0">
-                    <a:solidFill>
-                      <a:schemeClr val="accent2">
-                        <a:lumMod val="50000"/>
-                      </a:schemeClr>
-                    </a:solidFill>
-                    <a:effectLst/>
-                  </a:rPr>
-                  <a:t>prevTxHash</a:t>
-                </a:r>
-                <a:r>
-                  <a:rPr lang="en-US" sz="1200" dirty="0">
-                    <a:solidFill>
-                      <a:schemeClr val="accent2">
-                        <a:lumMod val="50000"/>
-                      </a:schemeClr>
-                    </a:solidFill>
-                    <a:effectLst/>
-                  </a:rPr>
-                  <a:t>=hash_1</a:t>
-                </a:r>
-              </a:p>
-              <a:p>
-                <a:pPr algn="ctr"/>
-                <a:r>
-                  <a:rPr lang="en-US" sz="1200" b="1" u="sng" dirty="0">
-                    <a:solidFill>
-                      <a:schemeClr val="accent2">
-                        <a:lumMod val="50000"/>
-                      </a:schemeClr>
-                    </a:solidFill>
-                    <a:effectLst/>
-                  </a:rPr>
-                  <a:t>outputIndex</a:t>
-                </a:r>
-                <a:r>
-                  <a:rPr lang="en-US" sz="1200" dirty="0">
-                    <a:solidFill>
-                      <a:schemeClr val="accent2">
-                        <a:lumMod val="50000"/>
-                      </a:schemeClr>
-                    </a:solidFill>
-                  </a:rPr>
-                  <a:t>=1</a:t>
-                </a:r>
-              </a:p>
-              <a:p>
-                <a:pPr algn="ctr"/>
-                <a:r>
-                  <a:rPr lang="en-US" sz="1200" b="1" u="sng" dirty="0">
-                    <a:solidFill>
-                      <a:schemeClr val="accent2">
-                        <a:lumMod val="50000"/>
-                      </a:schemeClr>
-                    </a:solidFill>
-                  </a:rPr>
-                  <a:t>s</a:t>
-                </a:r>
-                <a:r>
-                  <a:rPr lang="en-US" sz="1200" b="1" u="sng" dirty="0">
-                    <a:solidFill>
-                      <a:schemeClr val="accent2">
-                        <a:lumMod val="50000"/>
-                      </a:schemeClr>
-                    </a:solidFill>
-                    <a:effectLst/>
-                  </a:rPr>
-                  <a:t>ignature</a:t>
-                </a:r>
-                <a:r>
-                  <a:rPr lang="en-US" sz="1200" dirty="0">
-                    <a:solidFill>
-                      <a:schemeClr val="accent2">
-                        <a:lumMod val="50000"/>
-                      </a:schemeClr>
-                    </a:solidFill>
-                  </a:rPr>
-                  <a:t>=?</a:t>
-                </a:r>
-                <a:endParaRPr lang="en-US" sz="1200" dirty="0">
-                  <a:solidFill>
-                    <a:schemeClr val="accent2">
-                      <a:lumMod val="50000"/>
-                    </a:schemeClr>
-                  </a:solidFill>
-                  <a:effectLst/>
-                </a:endParaRPr>
-              </a:p>
-            </p:txBody>
-          </p:sp>
-          <p:sp>
-            <p:nvSpPr>
-              <p:cNvPr id="64" name="TextBox 63">
-                <a:extLst>
-                  <a:ext uri="{FF2B5EF4-FFF2-40B4-BE49-F238E27FC236}">
-                    <a16:creationId xmlns:a16="http://schemas.microsoft.com/office/drawing/2014/main" id="{A1A2DAD1-840C-CA4F-92A9-1C9EBD577CD0}"/>
-                  </a:ext>
-                </a:extLst>
-              </p:cNvPr>
-              <p:cNvSpPr txBox="1"/>
-              <p:nvPr/>
-            </p:nvSpPr>
-            <p:spPr>
-              <a:xfrm>
-                <a:off x="6885173" y="1583493"/>
-                <a:ext cx="357790" cy="369332"/>
-              </a:xfrm>
-              <a:prstGeom prst="rect">
-                <a:avLst/>
-              </a:prstGeom>
-              <a:noFill/>
-            </p:spPr>
-            <p:txBody>
-              <a:bodyPr wrap="none" rtlCol="0">
-                <a:spAutoFit/>
-              </a:bodyPr>
-              <a:lstStyle/>
-              <a:p>
-                <a:r>
-                  <a:rPr lang="en-US" dirty="0">
-                    <a:solidFill>
-                      <a:schemeClr val="accent2">
-                        <a:lumMod val="50000"/>
-                      </a:schemeClr>
-                    </a:solidFill>
-                  </a:rPr>
-                  <a:t>·</a:t>
-                </a:r>
-                <a:r>
-                  <a:rPr lang="en-US" altLang="zh-CN" dirty="0">
-                    <a:solidFill>
-                      <a:schemeClr val="accent2">
-                        <a:lumMod val="50000"/>
-                      </a:schemeClr>
-                    </a:solidFill>
-                  </a:rPr>
-                  <a:t>··</a:t>
-                </a:r>
-                <a:endParaRPr lang="en-CN" dirty="0">
-                  <a:solidFill>
-                    <a:schemeClr val="accent2">
-                      <a:lumMod val="50000"/>
-                    </a:schemeClr>
-                  </a:solidFill>
-                </a:endParaRPr>
-              </a:p>
-            </p:txBody>
-          </p:sp>
-          <p:cxnSp>
-            <p:nvCxnSpPr>
-              <p:cNvPr id="65" name="Straight Arrow Connector 64">
-                <a:extLst>
-                  <a:ext uri="{FF2B5EF4-FFF2-40B4-BE49-F238E27FC236}">
-                    <a16:creationId xmlns:a16="http://schemas.microsoft.com/office/drawing/2014/main" id="{00666833-DD83-E742-A51D-3EE37E7999C3}"/>
-                  </a:ext>
-                </a:extLst>
-              </p:cNvPr>
-              <p:cNvCxnSpPr>
-                <a:cxnSpLocks/>
-                <a:stCxn id="51" idx="3"/>
-                <a:endCxn id="66" idx="1"/>
-              </p:cNvCxnSpPr>
-              <p:nvPr/>
-            </p:nvCxnSpPr>
-            <p:spPr>
-              <a:xfrm flipV="1">
-                <a:off x="7451761" y="2908621"/>
-                <a:ext cx="540328" cy="2677"/>
-              </a:xfrm>
-              <a:prstGeom prst="straightConnector1">
-                <a:avLst/>
-              </a:prstGeom>
-              <a:ln w="12700">
-                <a:solidFill>
-                  <a:schemeClr val="accent1"/>
-                </a:solidFill>
-                <a:prstDash val="sysDash"/>
-                <a:tailEnd type="stealth" w="lg" len="lg"/>
-              </a:ln>
-            </p:spPr>
-            <p:style>
-              <a:lnRef idx="1">
-                <a:schemeClr val="accent1"/>
-              </a:lnRef>
-              <a:fillRef idx="0">
-                <a:schemeClr val="accent1"/>
-              </a:fillRef>
-              <a:effectRef idx="0">
-                <a:schemeClr val="accent1"/>
-              </a:effectRef>
-              <a:fontRef idx="minor">
-                <a:schemeClr val="tx1"/>
-              </a:fontRef>
-            </p:style>
-          </p:cxnSp>
-          <p:sp>
-            <p:nvSpPr>
-              <p:cNvPr id="66" name="Rectangle 65">
-                <a:extLst>
-                  <a:ext uri="{FF2B5EF4-FFF2-40B4-BE49-F238E27FC236}">
-                    <a16:creationId xmlns:a16="http://schemas.microsoft.com/office/drawing/2014/main" id="{ACA93623-DA3C-054B-B1A0-D3BEC6B5C33A}"/>
-                  </a:ext>
-                </a:extLst>
-              </p:cNvPr>
-              <p:cNvSpPr/>
-              <p:nvPr/>
-            </p:nvSpPr>
-            <p:spPr>
-              <a:xfrm>
-                <a:off x="7992089" y="2576036"/>
-                <a:ext cx="1643861" cy="665170"/>
-              </a:xfrm>
-              <a:prstGeom prst="rect">
-                <a:avLst/>
-              </a:prstGeom>
-              <a:noFill/>
-              <a:ln w="19050">
-                <a:solidFill>
-                  <a:schemeClr val="accent1"/>
-                </a:solidFill>
-                <a:prstDash val="sysDash"/>
-              </a:ln>
-            </p:spPr>
-            <p:style>
-              <a:lnRef idx="2">
-                <a:schemeClr val="accent1">
-                  <a:shade val="50000"/>
-                </a:schemeClr>
-              </a:lnRef>
-              <a:fillRef idx="1">
-                <a:schemeClr val="accent1"/>
-              </a:fillRef>
-              <a:effectRef idx="0">
-                <a:schemeClr val="accent1"/>
-              </a:effectRef>
-              <a:fontRef idx="minor">
-                <a:schemeClr val="lt1"/>
-              </a:fontRef>
-            </p:style>
-            <p:txBody>
-              <a:bodyPr rtlCol="0" anchor="ctr"/>
-              <a:lstStyle/>
-              <a:p>
-                <a:pPr algn="ctr"/>
-                <a:r>
-                  <a:rPr lang="en-US" sz="1200" b="1" u="sng" dirty="0">
-                    <a:solidFill>
-                      <a:schemeClr val="accent1">
-                        <a:lumMod val="50000"/>
-                      </a:schemeClr>
-                    </a:solidFill>
-                    <a:effectLst/>
-                  </a:rPr>
-                  <a:t>value</a:t>
-                </a:r>
-                <a:r>
-                  <a:rPr lang="en-US" altLang="zh-CN" sz="1200" dirty="0">
-                    <a:solidFill>
-                      <a:schemeClr val="accent1">
-                        <a:lumMod val="50000"/>
-                      </a:schemeClr>
-                    </a:solidFill>
-                    <a:effectLst/>
-                  </a:rPr>
-                  <a:t>=10</a:t>
-                </a:r>
-                <a:endParaRPr lang="en-US" sz="1200" dirty="0">
-                  <a:solidFill>
-                    <a:schemeClr val="accent1">
-                      <a:lumMod val="50000"/>
-                    </a:schemeClr>
-                  </a:solidFill>
-                  <a:effectLst/>
-                </a:endParaRPr>
-              </a:p>
-              <a:p>
-                <a:pPr algn="ctr"/>
-                <a:r>
-                  <a:rPr lang="en-US" sz="1200" b="1" u="sng" dirty="0">
-                    <a:solidFill>
-                      <a:schemeClr val="accent1">
-                        <a:lumMod val="50000"/>
-                      </a:schemeClr>
-                    </a:solidFill>
-                    <a:effectLst/>
-                  </a:rPr>
-                  <a:t>address</a:t>
-                </a:r>
-                <a:r>
-                  <a:rPr lang="en-US" altLang="zh-CN" sz="1200" dirty="0">
-                    <a:solidFill>
-                      <a:schemeClr val="accent1">
-                        <a:lumMod val="50000"/>
-                      </a:schemeClr>
-                    </a:solidFill>
-                    <a:effectLst/>
-                  </a:rPr>
-                  <a:t>=?</a:t>
-                </a:r>
-                <a:endParaRPr lang="en-US" sz="1200" dirty="0">
-                  <a:solidFill>
-                    <a:schemeClr val="accent1">
-                      <a:lumMod val="50000"/>
-                    </a:schemeClr>
-                  </a:solidFill>
-                  <a:effectLst/>
-                </a:endParaRPr>
-              </a:p>
-            </p:txBody>
-          </p:sp>
-          <p:sp>
-            <p:nvSpPr>
-              <p:cNvPr id="70" name="TextBox 69">
-                <a:extLst>
-                  <a:ext uri="{FF2B5EF4-FFF2-40B4-BE49-F238E27FC236}">
-                    <a16:creationId xmlns:a16="http://schemas.microsoft.com/office/drawing/2014/main" id="{5DD17A14-847F-F94B-9973-663F47403485}"/>
-                  </a:ext>
-                </a:extLst>
-              </p:cNvPr>
-              <p:cNvSpPr txBox="1"/>
-              <p:nvPr/>
-            </p:nvSpPr>
-            <p:spPr>
-              <a:xfrm>
-                <a:off x="6885173" y="3131880"/>
-                <a:ext cx="357790" cy="369332"/>
-              </a:xfrm>
-              <a:prstGeom prst="rect">
-                <a:avLst/>
-              </a:prstGeom>
-              <a:noFill/>
-            </p:spPr>
-            <p:txBody>
-              <a:bodyPr wrap="none" rtlCol="0">
-                <a:spAutoFit/>
-              </a:bodyPr>
-              <a:lstStyle/>
-              <a:p>
-                <a:r>
-                  <a:rPr lang="en-US" dirty="0">
-                    <a:solidFill>
-                      <a:schemeClr val="accent1">
-                        <a:lumMod val="50000"/>
-                      </a:schemeClr>
-                    </a:solidFill>
-                  </a:rPr>
-                  <a:t>·</a:t>
-                </a:r>
-                <a:r>
-                  <a:rPr lang="en-US" altLang="zh-CN" dirty="0">
-                    <a:solidFill>
-                      <a:schemeClr val="accent1">
-                        <a:lumMod val="50000"/>
-                      </a:schemeClr>
-                    </a:solidFill>
-                  </a:rPr>
-                  <a:t>··</a:t>
-                </a:r>
-                <a:endParaRPr lang="en-CN" dirty="0">
-                  <a:solidFill>
-                    <a:schemeClr val="accent1">
-                      <a:lumMod val="50000"/>
-                    </a:schemeClr>
-                  </a:solidFill>
-                </a:endParaRPr>
-              </a:p>
-            </p:txBody>
-          </p:sp>
-          <p:cxnSp>
-            <p:nvCxnSpPr>
-              <p:cNvPr id="81" name="Straight Arrow Connector 80">
-                <a:extLst>
-                  <a:ext uri="{FF2B5EF4-FFF2-40B4-BE49-F238E27FC236}">
-                    <a16:creationId xmlns:a16="http://schemas.microsoft.com/office/drawing/2014/main" id="{F4750DA7-F8A2-9A4D-B455-B34DB5B653ED}"/>
-                  </a:ext>
-                </a:extLst>
-              </p:cNvPr>
-              <p:cNvCxnSpPr>
-                <a:cxnSpLocks/>
-                <a:endCxn id="20" idx="1"/>
-              </p:cNvCxnSpPr>
-              <p:nvPr/>
-            </p:nvCxnSpPr>
-            <p:spPr>
-              <a:xfrm>
-                <a:off x="2248862" y="950762"/>
-                <a:ext cx="600164" cy="0"/>
-              </a:xfrm>
-              <a:prstGeom prst="straightConnector1">
-                <a:avLst/>
-              </a:prstGeom>
-              <a:ln w="12700">
-                <a:solidFill>
-                  <a:schemeClr val="tx1"/>
-                </a:solidFill>
-                <a:prstDash val="solid"/>
-                <a:tailEnd type="stealth" w="lg" len="lg"/>
-              </a:ln>
-            </p:spPr>
-            <p:style>
-              <a:lnRef idx="1">
-                <a:schemeClr val="accent1"/>
-              </a:lnRef>
-              <a:fillRef idx="0">
-                <a:schemeClr val="accent1"/>
-              </a:fillRef>
-              <a:effectRef idx="0">
-                <a:schemeClr val="accent1"/>
-              </a:effectRef>
-              <a:fontRef idx="minor">
-                <a:schemeClr val="tx1"/>
-              </a:fontRef>
-            </p:style>
-          </p:cxnSp>
-          <p:cxnSp>
-            <p:nvCxnSpPr>
-              <p:cNvPr id="88" name="Straight Arrow Connector 87">
-                <a:extLst>
-                  <a:ext uri="{FF2B5EF4-FFF2-40B4-BE49-F238E27FC236}">
-                    <a16:creationId xmlns:a16="http://schemas.microsoft.com/office/drawing/2014/main" id="{E10AE211-ED01-A34B-93AA-DAC410F0333F}"/>
-                  </a:ext>
-                </a:extLst>
-              </p:cNvPr>
-              <p:cNvCxnSpPr>
-                <a:cxnSpLocks/>
-                <a:endCxn id="47" idx="1"/>
-              </p:cNvCxnSpPr>
-              <p:nvPr/>
-            </p:nvCxnSpPr>
-            <p:spPr>
-              <a:xfrm>
-                <a:off x="6080946" y="950761"/>
-                <a:ext cx="595429" cy="1"/>
-              </a:xfrm>
-              <a:prstGeom prst="straightConnector1">
-                <a:avLst/>
-              </a:prstGeom>
-              <a:ln w="12700">
-                <a:solidFill>
-                  <a:schemeClr val="tx1"/>
-                </a:solidFill>
-                <a:prstDash val="solid"/>
-                <a:tailEnd type="stealth" w="lg" len="lg"/>
-              </a:ln>
-            </p:spPr>
-            <p:style>
-              <a:lnRef idx="1">
-                <a:schemeClr val="accent1"/>
-              </a:lnRef>
-              <a:fillRef idx="0">
-                <a:schemeClr val="accent1"/>
-              </a:fillRef>
-              <a:effectRef idx="0">
-                <a:schemeClr val="accent1"/>
-              </a:effectRef>
-              <a:fontRef idx="minor">
-                <a:schemeClr val="tx1"/>
-              </a:fontRef>
-            </p:style>
-          </p:cxnSp>
-          <p:cxnSp>
-            <p:nvCxnSpPr>
-              <p:cNvPr id="93" name="Straight Arrow Connector 92">
-                <a:extLst>
-                  <a:ext uri="{FF2B5EF4-FFF2-40B4-BE49-F238E27FC236}">
-                    <a16:creationId xmlns:a16="http://schemas.microsoft.com/office/drawing/2014/main" id="{96F9657D-CFA4-E948-909D-FA4CB62C5083}"/>
-                  </a:ext>
-                </a:extLst>
-              </p:cNvPr>
-              <p:cNvCxnSpPr>
-                <a:cxnSpLocks/>
-              </p:cNvCxnSpPr>
-              <p:nvPr/>
-            </p:nvCxnSpPr>
-            <p:spPr>
-              <a:xfrm>
-                <a:off x="2248862" y="1359460"/>
-                <a:ext cx="600164" cy="0"/>
-              </a:xfrm>
-              <a:prstGeom prst="straightConnector1">
-                <a:avLst/>
-              </a:prstGeom>
-              <a:ln w="12700">
-                <a:solidFill>
-                  <a:schemeClr val="tx1"/>
-                </a:solidFill>
-                <a:prstDash val="solid"/>
-                <a:tailEnd type="stealth" w="lg" len="lg"/>
-              </a:ln>
-            </p:spPr>
-            <p:style>
-              <a:lnRef idx="1">
-                <a:schemeClr val="accent1"/>
-              </a:lnRef>
-              <a:fillRef idx="0">
-                <a:schemeClr val="accent1"/>
-              </a:fillRef>
-              <a:effectRef idx="0">
-                <a:schemeClr val="accent1"/>
-              </a:effectRef>
-              <a:fontRef idx="minor">
-                <a:schemeClr val="tx1"/>
-              </a:fontRef>
-            </p:style>
-          </p:cxnSp>
-          <p:cxnSp>
-            <p:nvCxnSpPr>
-              <p:cNvPr id="94" name="Straight Arrow Connector 93">
-                <a:extLst>
-                  <a:ext uri="{FF2B5EF4-FFF2-40B4-BE49-F238E27FC236}">
-                    <a16:creationId xmlns:a16="http://schemas.microsoft.com/office/drawing/2014/main" id="{855E2B35-0E9F-0240-86B6-8E8F2F629225}"/>
-                  </a:ext>
-                </a:extLst>
-              </p:cNvPr>
-              <p:cNvCxnSpPr>
-                <a:cxnSpLocks/>
-              </p:cNvCxnSpPr>
-              <p:nvPr/>
-            </p:nvCxnSpPr>
-            <p:spPr>
-              <a:xfrm>
-                <a:off x="2248954" y="1768159"/>
-                <a:ext cx="600164" cy="0"/>
-              </a:xfrm>
-              <a:prstGeom prst="straightConnector1">
-                <a:avLst/>
-              </a:prstGeom>
-              <a:ln w="12700">
-                <a:solidFill>
-                  <a:schemeClr val="tx1"/>
-                </a:solidFill>
-                <a:prstDash val="solid"/>
-                <a:tailEnd type="stealth" w="lg" len="lg"/>
-              </a:ln>
-            </p:spPr>
-            <p:style>
-              <a:lnRef idx="1">
-                <a:schemeClr val="accent1"/>
-              </a:lnRef>
-              <a:fillRef idx="0">
-                <a:schemeClr val="accent1"/>
-              </a:fillRef>
-              <a:effectRef idx="0">
-                <a:schemeClr val="accent1"/>
-              </a:effectRef>
-              <a:fontRef idx="minor">
-                <a:schemeClr val="tx1"/>
-              </a:fontRef>
-            </p:style>
-          </p:cxnSp>
-          <p:sp>
-            <p:nvSpPr>
-              <p:cNvPr id="100" name="Rectangle 99">
-                <a:extLst>
-                  <a:ext uri="{FF2B5EF4-FFF2-40B4-BE49-F238E27FC236}">
-                    <a16:creationId xmlns:a16="http://schemas.microsoft.com/office/drawing/2014/main" id="{7C977875-8EB8-6344-A902-5ADF96A38CF9}"/>
-                  </a:ext>
-                </a:extLst>
-              </p:cNvPr>
-              <p:cNvSpPr/>
-              <p:nvPr/>
-            </p:nvSpPr>
-            <p:spPr>
-              <a:xfrm>
-                <a:off x="4222573" y="2278578"/>
-                <a:ext cx="1846180" cy="1554512"/>
-              </a:xfrm>
-              <a:prstGeom prst="rect">
-                <a:avLst/>
-              </a:prstGeom>
-              <a:noFill/>
-              <a:ln w="19050">
-                <a:solidFill>
-                  <a:schemeClr val="accent6"/>
-                </a:solidFill>
-              </a:ln>
-            </p:spPr>
-            <p:style>
-              <a:lnRef idx="2">
-                <a:schemeClr val="accent1">
-                  <a:shade val="50000"/>
-                </a:schemeClr>
-              </a:lnRef>
-              <a:fillRef idx="1">
-                <a:schemeClr val="accent1"/>
-              </a:fillRef>
-              <a:effectRef idx="0">
-                <a:schemeClr val="accent1"/>
-              </a:effectRef>
-              <a:fontRef idx="minor">
-                <a:schemeClr val="lt1"/>
-              </a:fontRef>
-            </p:style>
-            <p:txBody>
-              <a:bodyPr rtlCol="0" anchor="ctr"/>
-              <a:lstStyle/>
-              <a:p>
-                <a:pPr algn="ctr"/>
-                <a:endParaRPr lang="en-CN">
-                  <a:solidFill>
-                    <a:schemeClr val="accent6">
-                      <a:lumMod val="50000"/>
-                    </a:schemeClr>
-                  </a:solidFill>
-                </a:endParaRPr>
-              </a:p>
-            </p:txBody>
-          </p:sp>
-          <p:sp>
-            <p:nvSpPr>
-              <p:cNvPr id="101" name="Rectangle 100">
-                <a:extLst>
-                  <a:ext uri="{FF2B5EF4-FFF2-40B4-BE49-F238E27FC236}">
-                    <a16:creationId xmlns:a16="http://schemas.microsoft.com/office/drawing/2014/main" id="{3F711A4F-24A0-B94E-8746-BDD3737EF0E3}"/>
-                  </a:ext>
-                </a:extLst>
-              </p:cNvPr>
-              <p:cNvSpPr/>
-              <p:nvPr/>
-            </p:nvSpPr>
-            <p:spPr>
-              <a:xfrm>
-                <a:off x="4507261" y="2357089"/>
-                <a:ext cx="1281634" cy="291737"/>
-              </a:xfrm>
-              <a:prstGeom prst="rect">
-                <a:avLst/>
-              </a:prstGeom>
-              <a:noFill/>
-              <a:ln w="19050">
-                <a:solidFill>
-                  <a:schemeClr val="accent6"/>
-                </a:solidFill>
-              </a:ln>
-            </p:spPr>
-            <p:style>
-              <a:lnRef idx="2">
-                <a:schemeClr val="accent1">
-                  <a:shade val="50000"/>
-                </a:schemeClr>
-              </a:lnRef>
-              <a:fillRef idx="1">
-                <a:schemeClr val="accent1"/>
-              </a:fillRef>
-              <a:effectRef idx="0">
-                <a:schemeClr val="accent1"/>
-              </a:effectRef>
-              <a:fontRef idx="minor">
-                <a:schemeClr val="lt1"/>
-              </a:fontRef>
-            </p:style>
-            <p:txBody>
-              <a:bodyPr rtlCol="0" anchor="ctr"/>
-              <a:lstStyle/>
-              <a:p>
-                <a:pPr algn="ctr"/>
-                <a:r>
-                  <a:rPr lang="en-CN" sz="1200" dirty="0">
-                    <a:solidFill>
-                      <a:schemeClr val="accent6">
-                        <a:lumMod val="50000"/>
-                      </a:schemeClr>
-                    </a:solidFill>
-                  </a:rPr>
-                  <a:t>utxo_</a:t>
-                </a:r>
-                <a:r>
-                  <a:rPr lang="en-US" sz="1200" dirty="0">
-                    <a:solidFill>
-                      <a:schemeClr val="accent6">
-                        <a:lumMod val="50000"/>
-                      </a:schemeClr>
-                    </a:solidFill>
-                  </a:rPr>
-                  <a:t>a: output_0</a:t>
-                </a:r>
-                <a:endParaRPr lang="en-CN" sz="1200" dirty="0">
-                  <a:solidFill>
-                    <a:schemeClr val="accent6">
-                      <a:lumMod val="50000"/>
-                    </a:schemeClr>
-                  </a:solidFill>
-                </a:endParaRPr>
-              </a:p>
-            </p:txBody>
-          </p:sp>
-          <p:sp>
-            <p:nvSpPr>
-              <p:cNvPr id="102" name="Rectangle 101">
-                <a:extLst>
-                  <a:ext uri="{FF2B5EF4-FFF2-40B4-BE49-F238E27FC236}">
-                    <a16:creationId xmlns:a16="http://schemas.microsoft.com/office/drawing/2014/main" id="{3AAB5757-F3E7-1945-BE2D-0715ED1312A7}"/>
-                  </a:ext>
-                </a:extLst>
-              </p:cNvPr>
-              <p:cNvSpPr/>
-              <p:nvPr/>
-            </p:nvSpPr>
-            <p:spPr>
-              <a:xfrm>
-                <a:off x="4507261" y="2765463"/>
-                <a:ext cx="1281634" cy="291737"/>
-              </a:xfrm>
-              <a:prstGeom prst="rect">
-                <a:avLst/>
-              </a:prstGeom>
-              <a:noFill/>
-              <a:ln w="19050">
-                <a:solidFill>
-                  <a:schemeClr val="accent6"/>
-                </a:solidFill>
-              </a:ln>
-            </p:spPr>
-            <p:style>
-              <a:lnRef idx="2">
-                <a:schemeClr val="accent1">
-                  <a:shade val="50000"/>
-                </a:schemeClr>
-              </a:lnRef>
-              <a:fillRef idx="1">
-                <a:schemeClr val="accent1"/>
-              </a:fillRef>
-              <a:effectRef idx="0">
-                <a:schemeClr val="accent1"/>
-              </a:effectRef>
-              <a:fontRef idx="minor">
-                <a:schemeClr val="lt1"/>
-              </a:fontRef>
-            </p:style>
-            <p:txBody>
-              <a:bodyPr rtlCol="0" anchor="ctr"/>
-              <a:lstStyle/>
-              <a:p>
-                <a:pPr algn="ctr"/>
-                <a:r>
-                  <a:rPr lang="en-CN" sz="1200" dirty="0">
-                    <a:solidFill>
-                      <a:schemeClr val="accent6">
-                        <a:lumMod val="50000"/>
-                      </a:schemeClr>
-                    </a:solidFill>
-                  </a:rPr>
-                  <a:t>utxo_</a:t>
-                </a:r>
-                <a:r>
-                  <a:rPr lang="en-US" sz="1200" dirty="0">
-                    <a:solidFill>
-                      <a:schemeClr val="accent6">
-                        <a:lumMod val="50000"/>
-                      </a:schemeClr>
-                    </a:solidFill>
-                  </a:rPr>
-                  <a:t>b: output_1</a:t>
-                </a:r>
-                <a:endParaRPr lang="en-CN" sz="1200" dirty="0">
-                  <a:solidFill>
-                    <a:schemeClr val="accent6">
-                      <a:lumMod val="50000"/>
-                    </a:schemeClr>
-                  </a:solidFill>
-                </a:endParaRPr>
-              </a:p>
-            </p:txBody>
-          </p:sp>
-          <p:sp>
-            <p:nvSpPr>
-              <p:cNvPr id="103" name="Rectangle 102">
-                <a:extLst>
-                  <a:ext uri="{FF2B5EF4-FFF2-40B4-BE49-F238E27FC236}">
-                    <a16:creationId xmlns:a16="http://schemas.microsoft.com/office/drawing/2014/main" id="{B92EDF7C-B88A-D64E-BEF0-6ABFAEC5E211}"/>
-                  </a:ext>
-                </a:extLst>
-              </p:cNvPr>
-              <p:cNvSpPr/>
-              <p:nvPr/>
-            </p:nvSpPr>
-            <p:spPr>
-              <a:xfrm>
-                <a:off x="4507260" y="3174128"/>
-                <a:ext cx="1281633" cy="291737"/>
-              </a:xfrm>
-              <a:prstGeom prst="rect">
-                <a:avLst/>
-              </a:prstGeom>
-              <a:noFill/>
-              <a:ln w="19050">
-                <a:solidFill>
-                  <a:schemeClr val="accent6"/>
-                </a:solidFill>
-              </a:ln>
-            </p:spPr>
-            <p:style>
-              <a:lnRef idx="2">
-                <a:schemeClr val="accent1">
-                  <a:shade val="50000"/>
-                </a:schemeClr>
-              </a:lnRef>
-              <a:fillRef idx="1">
-                <a:schemeClr val="accent1"/>
-              </a:fillRef>
-              <a:effectRef idx="0">
-                <a:schemeClr val="accent1"/>
-              </a:effectRef>
-              <a:fontRef idx="minor">
-                <a:schemeClr val="lt1"/>
-              </a:fontRef>
-            </p:style>
-            <p:txBody>
-              <a:bodyPr rtlCol="0" anchor="ctr"/>
-              <a:lstStyle/>
-              <a:p>
-                <a:pPr algn="ctr"/>
-                <a:r>
-                  <a:rPr lang="en-CN" sz="1200" dirty="0">
-                    <a:solidFill>
-                      <a:schemeClr val="accent6">
-                        <a:lumMod val="50000"/>
-                      </a:schemeClr>
-                    </a:solidFill>
-                  </a:rPr>
-                  <a:t>utxo</a:t>
-                </a:r>
-                <a:r>
-                  <a:rPr lang="en-US" sz="1200" dirty="0">
-                    <a:solidFill>
-                      <a:schemeClr val="accent6">
-                        <a:lumMod val="50000"/>
-                      </a:schemeClr>
-                    </a:solidFill>
-                  </a:rPr>
-                  <a:t>_c: </a:t>
-                </a:r>
-                <a:r>
-                  <a:rPr lang="en-US" sz="1200" dirty="0" err="1">
-                    <a:solidFill>
-                      <a:schemeClr val="accent6">
-                        <a:lumMod val="50000"/>
-                      </a:schemeClr>
-                    </a:solidFill>
-                  </a:rPr>
-                  <a:t>output_n</a:t>
-                </a:r>
-                <a:endParaRPr lang="en-CN" sz="1200" dirty="0">
-                  <a:solidFill>
-                    <a:schemeClr val="accent6">
-                      <a:lumMod val="50000"/>
-                    </a:schemeClr>
-                  </a:solidFill>
-                </a:endParaRPr>
-              </a:p>
-            </p:txBody>
-          </p:sp>
-          <p:cxnSp>
-            <p:nvCxnSpPr>
-              <p:cNvPr id="74" name="Straight Arrow Connector 73">
-                <a:extLst>
-                  <a:ext uri="{FF2B5EF4-FFF2-40B4-BE49-F238E27FC236}">
-                    <a16:creationId xmlns:a16="http://schemas.microsoft.com/office/drawing/2014/main" id="{A16412D8-FDE4-5F42-A360-6D892189EF06}"/>
-                  </a:ext>
-                </a:extLst>
-              </p:cNvPr>
-              <p:cNvCxnSpPr>
-                <a:cxnSpLocks/>
-                <a:stCxn id="28" idx="3"/>
-                <a:endCxn id="102" idx="1"/>
-              </p:cNvCxnSpPr>
-              <p:nvPr/>
-            </p:nvCxnSpPr>
-            <p:spPr>
-              <a:xfrm>
-                <a:off x="3624412" y="2911298"/>
-                <a:ext cx="882849" cy="34"/>
-              </a:xfrm>
-              <a:prstGeom prst="straightConnector1">
-                <a:avLst/>
-              </a:prstGeom>
-              <a:ln w="12700">
-                <a:solidFill>
-                  <a:schemeClr val="tx1"/>
-                </a:solidFill>
-                <a:prstDash val="solid"/>
-                <a:tailEnd type="stealth" w="lg" len="lg"/>
-              </a:ln>
-            </p:spPr>
-            <p:style>
-              <a:lnRef idx="1">
-                <a:schemeClr val="accent1"/>
-              </a:lnRef>
-              <a:fillRef idx="0">
-                <a:schemeClr val="accent1"/>
-              </a:fillRef>
-              <a:effectRef idx="0">
-                <a:schemeClr val="accent1"/>
-              </a:effectRef>
-              <a:fontRef idx="minor">
-                <a:schemeClr val="tx1"/>
-              </a:fontRef>
-            </p:style>
-          </p:cxnSp>
-          <p:cxnSp>
-            <p:nvCxnSpPr>
-              <p:cNvPr id="79" name="Straight Arrow Connector 78">
-                <a:extLst>
-                  <a:ext uri="{FF2B5EF4-FFF2-40B4-BE49-F238E27FC236}">
-                    <a16:creationId xmlns:a16="http://schemas.microsoft.com/office/drawing/2014/main" id="{C07CB2F5-FBC1-FF41-9A98-C19E4B9E12C2}"/>
-                  </a:ext>
-                </a:extLst>
-              </p:cNvPr>
-              <p:cNvCxnSpPr>
-                <a:cxnSpLocks/>
-                <a:stCxn id="29" idx="3"/>
-                <a:endCxn id="103" idx="1"/>
-              </p:cNvCxnSpPr>
-              <p:nvPr/>
-            </p:nvCxnSpPr>
-            <p:spPr>
-              <a:xfrm>
-                <a:off x="3624412" y="3319997"/>
-                <a:ext cx="882848" cy="0"/>
-              </a:xfrm>
-              <a:prstGeom prst="straightConnector1">
-                <a:avLst/>
-              </a:prstGeom>
-              <a:ln w="12700">
-                <a:solidFill>
-                  <a:schemeClr val="tx1"/>
-                </a:solidFill>
-                <a:prstDash val="solid"/>
-                <a:tailEnd type="stealth" w="lg" len="lg"/>
-              </a:ln>
-            </p:spPr>
-            <p:style>
-              <a:lnRef idx="1">
-                <a:schemeClr val="accent1"/>
-              </a:lnRef>
-              <a:fillRef idx="0">
-                <a:schemeClr val="accent1"/>
-              </a:fillRef>
-              <a:effectRef idx="0">
-                <a:schemeClr val="accent1"/>
-              </a:effectRef>
-              <a:fontRef idx="minor">
-                <a:schemeClr val="tx1"/>
-              </a:fontRef>
-            </p:style>
-          </p:cxnSp>
-          <p:cxnSp>
-            <p:nvCxnSpPr>
-              <p:cNvPr id="97" name="Straight Arrow Connector 96">
-                <a:extLst>
-                  <a:ext uri="{FF2B5EF4-FFF2-40B4-BE49-F238E27FC236}">
-                    <a16:creationId xmlns:a16="http://schemas.microsoft.com/office/drawing/2014/main" id="{217F1349-D5FC-CB4C-AC96-7E8EB44B0124}"/>
-                  </a:ext>
-                </a:extLst>
-              </p:cNvPr>
-              <p:cNvCxnSpPr>
-                <a:cxnSpLocks/>
-                <a:stCxn id="27" idx="3"/>
-                <a:endCxn id="101" idx="1"/>
-              </p:cNvCxnSpPr>
-              <p:nvPr/>
-            </p:nvCxnSpPr>
-            <p:spPr>
-              <a:xfrm>
-                <a:off x="3624412" y="2502599"/>
-                <a:ext cx="882849" cy="359"/>
-              </a:xfrm>
-              <a:prstGeom prst="straightConnector1">
-                <a:avLst/>
-              </a:prstGeom>
-              <a:ln w="12700">
-                <a:solidFill>
-                  <a:schemeClr val="tx1"/>
-                </a:solidFill>
-                <a:prstDash val="solid"/>
-                <a:tailEnd type="stealth" w="lg" len="lg"/>
-              </a:ln>
-            </p:spPr>
-            <p:style>
-              <a:lnRef idx="1">
-                <a:schemeClr val="accent1"/>
-              </a:lnRef>
-              <a:fillRef idx="0">
-                <a:schemeClr val="accent1"/>
-              </a:fillRef>
-              <a:effectRef idx="0">
-                <a:schemeClr val="accent1"/>
-              </a:effectRef>
-              <a:fontRef idx="minor">
-                <a:schemeClr val="tx1"/>
-              </a:fontRef>
-            </p:style>
-          </p:cxnSp>
-          <p:sp>
-            <p:nvSpPr>
-              <p:cNvPr id="107" name="TextBox 106">
-                <a:extLst>
-                  <a:ext uri="{FF2B5EF4-FFF2-40B4-BE49-F238E27FC236}">
-                    <a16:creationId xmlns:a16="http://schemas.microsoft.com/office/drawing/2014/main" id="{ABB619D8-E4BB-354D-87CD-F8E256CC5F5E}"/>
-                  </a:ext>
-                </a:extLst>
-              </p:cNvPr>
-              <p:cNvSpPr txBox="1"/>
-              <p:nvPr/>
-            </p:nvSpPr>
-            <p:spPr>
-              <a:xfrm>
-                <a:off x="4488257" y="3833090"/>
-                <a:ext cx="1319645" cy="369332"/>
-              </a:xfrm>
-              <a:prstGeom prst="rect">
-                <a:avLst/>
-              </a:prstGeom>
-              <a:noFill/>
-            </p:spPr>
-            <p:txBody>
-              <a:bodyPr wrap="square" rtlCol="0">
-                <a:spAutoFit/>
-              </a:bodyPr>
-              <a:lstStyle/>
-              <a:p>
-                <a:pPr algn="ctr"/>
-                <a:r>
-                  <a:rPr lang="en-CN" b="1" dirty="0">
-                    <a:latin typeface="Times New Roman" panose="02020603050405020304" pitchFamily="18" charset="0"/>
-                    <a:cs typeface="Times New Roman" panose="02020603050405020304" pitchFamily="18" charset="0"/>
-                  </a:rPr>
-                  <a:t>UTXOPool</a:t>
-                </a:r>
-              </a:p>
-            </p:txBody>
-          </p:sp>
-          <p:sp>
-            <p:nvSpPr>
-              <p:cNvPr id="127" name="Cross 126">
-                <a:extLst>
-                  <a:ext uri="{FF2B5EF4-FFF2-40B4-BE49-F238E27FC236}">
-                    <a16:creationId xmlns:a16="http://schemas.microsoft.com/office/drawing/2014/main" id="{BB9EBC05-B146-1740-BCCB-C2D60D23B198}"/>
-                  </a:ext>
-                </a:extLst>
-              </p:cNvPr>
-              <p:cNvSpPr/>
-              <p:nvPr/>
-            </p:nvSpPr>
-            <p:spPr>
-              <a:xfrm rot="13526020">
-                <a:off x="5689519" y="2662427"/>
-                <a:ext cx="206001" cy="206001"/>
-              </a:xfrm>
-              <a:prstGeom prst="plus">
-                <a:avLst>
-                  <a:gd name="adj" fmla="val 39750"/>
-                </a:avLst>
-              </a:prstGeom>
-              <a:solidFill>
-                <a:schemeClr val="accent2"/>
-              </a:solidFill>
-              <a:ln>
-                <a:solidFill>
-                  <a:schemeClr val="accent2">
-                    <a:lumMod val="50000"/>
-                  </a:schemeClr>
-                </a:solidFill>
-              </a:ln>
-            </p:spPr>
-            <p:style>
-              <a:lnRef idx="2">
-                <a:schemeClr val="accent1">
-                  <a:shade val="50000"/>
-                </a:schemeClr>
-              </a:lnRef>
-              <a:fillRef idx="1">
-                <a:schemeClr val="accent1"/>
-              </a:fillRef>
-              <a:effectRef idx="0">
-                <a:schemeClr val="accent1"/>
-              </a:effectRef>
-              <a:fontRef idx="minor">
-                <a:schemeClr val="lt1"/>
-              </a:fontRef>
-            </p:style>
-            <p:txBody>
-              <a:bodyPr rtlCol="0" anchor="ctr"/>
-              <a:lstStyle/>
-              <a:p>
-                <a:pPr algn="ctr"/>
-                <a:endParaRPr lang="en-CN"/>
-              </a:p>
-            </p:txBody>
-          </p:sp>
-          <p:sp>
-            <p:nvSpPr>
-              <p:cNvPr id="128" name="Rectangle 127">
-                <a:extLst>
-                  <a:ext uri="{FF2B5EF4-FFF2-40B4-BE49-F238E27FC236}">
-                    <a16:creationId xmlns:a16="http://schemas.microsoft.com/office/drawing/2014/main" id="{62F95F47-2B6B-0C4C-8491-28BDA523E7F6}"/>
-                  </a:ext>
-                </a:extLst>
-              </p:cNvPr>
-              <p:cNvSpPr/>
-              <p:nvPr/>
-            </p:nvSpPr>
-            <p:spPr>
-              <a:xfrm>
-                <a:off x="4507260" y="1480916"/>
-                <a:ext cx="1281633" cy="510001"/>
-              </a:xfrm>
-              <a:prstGeom prst="rect">
-                <a:avLst/>
-              </a:prstGeom>
-              <a:noFill/>
-              <a:ln w="19050">
-                <a:solidFill>
-                  <a:schemeClr val="accent6"/>
-                </a:solidFill>
-                <a:prstDash val="sysDash"/>
-              </a:ln>
-            </p:spPr>
-            <p:style>
-              <a:lnRef idx="2">
-                <a:schemeClr val="accent1">
-                  <a:shade val="50000"/>
-                </a:schemeClr>
-              </a:lnRef>
-              <a:fillRef idx="1">
-                <a:schemeClr val="accent1"/>
-              </a:fillRef>
-              <a:effectRef idx="0">
-                <a:schemeClr val="accent1"/>
-              </a:effectRef>
-              <a:fontRef idx="minor">
-                <a:schemeClr val="lt1"/>
-              </a:fontRef>
-            </p:style>
-            <p:txBody>
-              <a:bodyPr rtlCol="0" anchor="ctr"/>
-              <a:lstStyle/>
-              <a:p>
-                <a:pPr algn="ctr"/>
-                <a:r>
-                  <a:rPr lang="en-US" sz="1200" b="1" u="sng" dirty="0">
-                    <a:solidFill>
-                      <a:schemeClr val="accent6">
-                        <a:lumMod val="50000"/>
-                      </a:schemeClr>
-                    </a:solidFill>
-                    <a:effectLst/>
-                  </a:rPr>
-                  <a:t>txHash</a:t>
-                </a:r>
-                <a:r>
-                  <a:rPr lang="en-US" sz="1200" dirty="0">
-                    <a:solidFill>
-                      <a:schemeClr val="accent6">
-                        <a:lumMod val="50000"/>
-                      </a:schemeClr>
-                    </a:solidFill>
-                    <a:effectLst/>
-                  </a:rPr>
-                  <a:t>=hash_1</a:t>
-                </a:r>
-              </a:p>
-              <a:p>
-                <a:pPr algn="ctr"/>
-                <a:r>
-                  <a:rPr lang="en-US" sz="1200" b="1" u="sng" dirty="0">
-                    <a:solidFill>
-                      <a:schemeClr val="accent6">
-                        <a:lumMod val="50000"/>
-                      </a:schemeClr>
-                    </a:solidFill>
-                    <a:effectLst/>
-                  </a:rPr>
-                  <a:t>index</a:t>
-                </a:r>
-                <a:r>
-                  <a:rPr lang="en-US" sz="1200" dirty="0">
-                    <a:solidFill>
-                      <a:schemeClr val="accent6">
-                        <a:lumMod val="50000"/>
-                      </a:schemeClr>
-                    </a:solidFill>
-                  </a:rPr>
-                  <a:t>=0</a:t>
-                </a:r>
-              </a:p>
-            </p:txBody>
-          </p:sp>
-          <p:cxnSp>
-            <p:nvCxnSpPr>
-              <p:cNvPr id="129" name="Straight Arrow Connector 128">
-                <a:extLst>
-                  <a:ext uri="{FF2B5EF4-FFF2-40B4-BE49-F238E27FC236}">
-                    <a16:creationId xmlns:a16="http://schemas.microsoft.com/office/drawing/2014/main" id="{8ADA839C-1631-A74C-B0BC-6393530C3180}"/>
-                  </a:ext>
-                </a:extLst>
-              </p:cNvPr>
-              <p:cNvCxnSpPr>
-                <a:cxnSpLocks/>
-                <a:stCxn id="101" idx="0"/>
-                <a:endCxn id="128" idx="2"/>
-              </p:cNvCxnSpPr>
-              <p:nvPr/>
-            </p:nvCxnSpPr>
-            <p:spPr>
-              <a:xfrm flipH="1" flipV="1">
-                <a:off x="5148077" y="1990917"/>
-                <a:ext cx="1" cy="366172"/>
-              </a:xfrm>
-              <a:prstGeom prst="straightConnector1">
-                <a:avLst/>
-              </a:prstGeom>
-              <a:ln w="12700">
-                <a:solidFill>
-                  <a:schemeClr val="accent6"/>
-                </a:solidFill>
-                <a:prstDash val="sysDash"/>
-                <a:tailEnd type="stealth" w="lg" len="lg"/>
-              </a:ln>
-            </p:spPr>
-            <p:style>
-              <a:lnRef idx="1">
-                <a:schemeClr val="accent1"/>
-              </a:lnRef>
-              <a:fillRef idx="0">
-                <a:schemeClr val="accent1"/>
-              </a:fillRef>
-              <a:effectRef idx="0">
-                <a:schemeClr val="accent1"/>
-              </a:effectRef>
-              <a:fontRef idx="minor">
-                <a:schemeClr val="tx1"/>
-              </a:fontRef>
-            </p:style>
-          </p:cxnSp>
-          <p:sp>
-            <p:nvSpPr>
-              <p:cNvPr id="142" name="TextBox 141">
-                <a:extLst>
-                  <a:ext uri="{FF2B5EF4-FFF2-40B4-BE49-F238E27FC236}">
-                    <a16:creationId xmlns:a16="http://schemas.microsoft.com/office/drawing/2014/main" id="{0FE699C2-A542-ED4D-BBD3-17F225FD2FAF}"/>
-                  </a:ext>
-                </a:extLst>
-              </p:cNvPr>
-              <p:cNvSpPr txBox="1"/>
-              <p:nvPr/>
-            </p:nvSpPr>
-            <p:spPr>
-              <a:xfrm>
-                <a:off x="4969183" y="3462705"/>
-                <a:ext cx="357790" cy="369332"/>
-              </a:xfrm>
-              <a:prstGeom prst="rect">
-                <a:avLst/>
-              </a:prstGeom>
-              <a:noFill/>
-            </p:spPr>
-            <p:txBody>
-              <a:bodyPr wrap="none" rtlCol="0">
-                <a:spAutoFit/>
-              </a:bodyPr>
-              <a:lstStyle/>
-              <a:p>
-                <a:r>
-                  <a:rPr lang="en-US" dirty="0">
-                    <a:solidFill>
-                      <a:schemeClr val="accent6">
-                        <a:lumMod val="50000"/>
-                      </a:schemeClr>
-                    </a:solidFill>
-                  </a:rPr>
-                  <a:t>·</a:t>
-                </a:r>
-                <a:r>
-                  <a:rPr lang="en-US" altLang="zh-CN" dirty="0">
-                    <a:solidFill>
-                      <a:schemeClr val="accent6">
-                        <a:lumMod val="50000"/>
-                      </a:schemeClr>
-                    </a:solidFill>
-                  </a:rPr>
-                  <a:t>··</a:t>
-                </a:r>
-                <a:endParaRPr lang="en-CN" dirty="0">
-                  <a:solidFill>
-                    <a:schemeClr val="accent6">
-                      <a:lumMod val="50000"/>
-                    </a:schemeClr>
-                  </a:solidFill>
-                </a:endParaRPr>
-              </a:p>
-            </p:txBody>
-          </p:sp>
-          <p:cxnSp>
-            <p:nvCxnSpPr>
-              <p:cNvPr id="160" name="Straight Connector 159">
-                <a:extLst>
-                  <a:ext uri="{FF2B5EF4-FFF2-40B4-BE49-F238E27FC236}">
-                    <a16:creationId xmlns:a16="http://schemas.microsoft.com/office/drawing/2014/main" id="{ADF1AC3F-12A1-194B-A5A0-76D182166E46}"/>
-                  </a:ext>
-                </a:extLst>
-              </p:cNvPr>
-              <p:cNvCxnSpPr/>
-              <p:nvPr/>
-            </p:nvCxnSpPr>
-            <p:spPr>
-              <a:xfrm>
-                <a:off x="9904146" y="466723"/>
-                <a:ext cx="1319645" cy="0"/>
-              </a:xfrm>
-              <a:prstGeom prst="line">
-                <a:avLst/>
-              </a:prstGeom>
-              <a:ln w="19050">
-                <a:solidFill>
-                  <a:schemeClr val="tx1"/>
-                </a:solidFill>
-              </a:ln>
-            </p:spPr>
-            <p:style>
-              <a:lnRef idx="1">
-                <a:schemeClr val="accent1"/>
-              </a:lnRef>
-              <a:fillRef idx="0">
-                <a:schemeClr val="accent1"/>
-              </a:fillRef>
-              <a:effectRef idx="0">
-                <a:schemeClr val="accent1"/>
-              </a:effectRef>
-              <a:fontRef idx="minor">
-                <a:schemeClr val="tx1"/>
-              </a:fontRef>
-            </p:style>
-          </p:cxnSp>
-          <p:sp>
-            <p:nvSpPr>
-              <p:cNvPr id="161" name="Rounded Rectangle 160">
-                <a:extLst>
-                  <a:ext uri="{FF2B5EF4-FFF2-40B4-BE49-F238E27FC236}">
-                    <a16:creationId xmlns:a16="http://schemas.microsoft.com/office/drawing/2014/main" id="{318E53DF-A2E9-5C44-8530-79190B34A16E}"/>
-                  </a:ext>
-                </a:extLst>
-              </p:cNvPr>
-              <p:cNvSpPr/>
-              <p:nvPr/>
-            </p:nvSpPr>
-            <p:spPr>
-              <a:xfrm>
-                <a:off x="9904150" y="154709"/>
-                <a:ext cx="1319645" cy="3677328"/>
-              </a:xfrm>
-              <a:prstGeom prst="roundRect">
-                <a:avLst>
-                  <a:gd name="adj" fmla="val 6838"/>
-                </a:avLst>
-              </a:prstGeom>
-              <a:noFill/>
-              <a:ln w="19050">
-                <a:solidFill>
-                  <a:schemeClr val="tx1"/>
-                </a:solidFill>
-              </a:ln>
-            </p:spPr>
-            <p:style>
-              <a:lnRef idx="2">
-                <a:schemeClr val="accent1">
-                  <a:shade val="50000"/>
-                </a:schemeClr>
-              </a:lnRef>
-              <a:fillRef idx="1">
-                <a:schemeClr val="accent1"/>
-              </a:fillRef>
-              <a:effectRef idx="0">
-                <a:schemeClr val="accent1"/>
-              </a:effectRef>
-              <a:fontRef idx="minor">
-                <a:schemeClr val="lt1"/>
-              </a:fontRef>
-            </p:style>
-            <p:txBody>
-              <a:bodyPr rtlCol="0" anchor="ctr"/>
-              <a:lstStyle/>
-              <a:p>
-                <a:pPr algn="ctr"/>
-                <a:endParaRPr lang="en-CN">
-                  <a:latin typeface="Times New Roman" panose="02020603050405020304" pitchFamily="18" charset="0"/>
-                  <a:cs typeface="Times New Roman" panose="02020603050405020304" pitchFamily="18" charset="0"/>
-                </a:endParaRPr>
-              </a:p>
-            </p:txBody>
-          </p:sp>
-          <p:sp>
-            <p:nvSpPr>
-              <p:cNvPr id="162" name="TextBox 161">
-                <a:extLst>
-                  <a:ext uri="{FF2B5EF4-FFF2-40B4-BE49-F238E27FC236}">
-                    <a16:creationId xmlns:a16="http://schemas.microsoft.com/office/drawing/2014/main" id="{36B8152B-5234-6447-98AE-DE2AA44311CF}"/>
-                  </a:ext>
-                </a:extLst>
-              </p:cNvPr>
-              <p:cNvSpPr txBox="1"/>
-              <p:nvPr/>
-            </p:nvSpPr>
-            <p:spPr>
-              <a:xfrm>
-                <a:off x="9904146" y="148503"/>
-                <a:ext cx="1319645" cy="323165"/>
-              </a:xfrm>
-              <a:prstGeom prst="rect">
-                <a:avLst/>
-              </a:prstGeom>
-              <a:noFill/>
-            </p:spPr>
-            <p:txBody>
-              <a:bodyPr wrap="square" rtlCol="0">
-                <a:spAutoFit/>
-              </a:bodyPr>
-              <a:lstStyle/>
-              <a:p>
-                <a:pPr algn="ctr"/>
-                <a:r>
-                  <a:rPr lang="en-US" sz="1500" dirty="0"/>
-                  <a:t>h</a:t>
-                </a:r>
-                <a:r>
-                  <a:rPr lang="en-US" sz="1500" dirty="0">
-                    <a:effectLst/>
-                  </a:rPr>
-                  <a:t>ash_</a:t>
-                </a:r>
-                <a:r>
-                  <a:rPr lang="en-US" altLang="zh-CN" sz="1500" dirty="0">
-                    <a:effectLst/>
-                  </a:rPr>
-                  <a:t>3</a:t>
-                </a:r>
-                <a:endParaRPr lang="en-US" sz="1500" dirty="0">
-                  <a:effectLst/>
-                </a:endParaRPr>
-              </a:p>
-            </p:txBody>
-          </p:sp>
-          <p:sp>
-            <p:nvSpPr>
-              <p:cNvPr id="163" name="Rectangle 162">
-                <a:extLst>
-                  <a:ext uri="{FF2B5EF4-FFF2-40B4-BE49-F238E27FC236}">
-                    <a16:creationId xmlns:a16="http://schemas.microsoft.com/office/drawing/2014/main" id="{891B56CA-7676-CC4E-80A2-E43622E0E2BA}"/>
-                  </a:ext>
-                </a:extLst>
-              </p:cNvPr>
-              <p:cNvSpPr/>
-              <p:nvPr/>
-            </p:nvSpPr>
-            <p:spPr>
-              <a:xfrm>
-                <a:off x="10090044" y="729418"/>
-                <a:ext cx="947853" cy="1260086"/>
-              </a:xfrm>
-              <a:prstGeom prst="rect">
-                <a:avLst/>
-              </a:prstGeom>
-              <a:noFill/>
-              <a:ln w="19050">
-                <a:solidFill>
-                  <a:schemeClr val="accent2"/>
-                </a:solidFill>
-              </a:ln>
-            </p:spPr>
-            <p:style>
-              <a:lnRef idx="2">
-                <a:schemeClr val="accent1">
-                  <a:shade val="50000"/>
-                </a:schemeClr>
-              </a:lnRef>
-              <a:fillRef idx="1">
-                <a:schemeClr val="accent1"/>
-              </a:fillRef>
-              <a:effectRef idx="0">
-                <a:schemeClr val="accent1"/>
-              </a:effectRef>
-              <a:fontRef idx="minor">
-                <a:schemeClr val="lt1"/>
-              </a:fontRef>
-            </p:style>
-            <p:txBody>
-              <a:bodyPr rtlCol="0" anchor="ctr"/>
-              <a:lstStyle/>
-              <a:p>
-                <a:pPr algn="ctr"/>
-                <a:endParaRPr lang="en-CN">
-                  <a:solidFill>
-                    <a:schemeClr val="accent2">
-                      <a:lumMod val="50000"/>
-                    </a:schemeClr>
-                  </a:solidFill>
-                </a:endParaRPr>
-              </a:p>
-            </p:txBody>
-          </p:sp>
-          <p:sp>
-            <p:nvSpPr>
-              <p:cNvPr id="165" name="Rectangle 164">
-                <a:extLst>
-                  <a:ext uri="{FF2B5EF4-FFF2-40B4-BE49-F238E27FC236}">
-                    <a16:creationId xmlns:a16="http://schemas.microsoft.com/office/drawing/2014/main" id="{E6ED6404-08C7-9A4A-9BAB-94A5BBBBEF4C}"/>
-                  </a:ext>
-                </a:extLst>
-              </p:cNvPr>
-              <p:cNvSpPr/>
-              <p:nvPr/>
-            </p:nvSpPr>
-            <p:spPr>
-              <a:xfrm>
-                <a:off x="10176275" y="1618352"/>
-                <a:ext cx="775386" cy="291737"/>
-              </a:xfrm>
-              <a:prstGeom prst="rect">
-                <a:avLst/>
-              </a:prstGeom>
-              <a:noFill/>
-              <a:ln w="19050">
-                <a:solidFill>
-                  <a:schemeClr val="accent2"/>
-                </a:solidFill>
-              </a:ln>
-            </p:spPr>
-            <p:style>
-              <a:lnRef idx="2">
-                <a:schemeClr val="accent1">
-                  <a:shade val="50000"/>
-                </a:schemeClr>
-              </a:lnRef>
-              <a:fillRef idx="1">
-                <a:schemeClr val="accent1"/>
-              </a:fillRef>
-              <a:effectRef idx="0">
-                <a:schemeClr val="accent1"/>
-              </a:effectRef>
-              <a:fontRef idx="minor">
-                <a:schemeClr val="lt1"/>
-              </a:fontRef>
-            </p:style>
-            <p:txBody>
-              <a:bodyPr rtlCol="0" anchor="ctr"/>
-              <a:lstStyle/>
-              <a:p>
-                <a:pPr algn="ctr"/>
-                <a:r>
-                  <a:rPr lang="en-CN" sz="1200" dirty="0">
-                    <a:solidFill>
-                      <a:schemeClr val="accent2">
-                        <a:lumMod val="50000"/>
-                      </a:schemeClr>
-                    </a:solidFill>
-                  </a:rPr>
-                  <a:t>input_</a:t>
-                </a:r>
-                <a:r>
-                  <a:rPr lang="en-US" sz="1200" dirty="0">
-                    <a:solidFill>
-                      <a:schemeClr val="accent2">
-                        <a:lumMod val="50000"/>
-                      </a:schemeClr>
-                    </a:solidFill>
-                  </a:rPr>
-                  <a:t>0</a:t>
-                </a:r>
-                <a:endParaRPr lang="en-CN" sz="1200" dirty="0">
-                  <a:solidFill>
-                    <a:schemeClr val="accent2">
-                      <a:lumMod val="50000"/>
-                    </a:schemeClr>
-                  </a:solidFill>
-                </a:endParaRPr>
-              </a:p>
-            </p:txBody>
-          </p:sp>
-          <p:sp>
-            <p:nvSpPr>
-              <p:cNvPr id="175" name="TextBox 174">
-                <a:extLst>
-                  <a:ext uri="{FF2B5EF4-FFF2-40B4-BE49-F238E27FC236}">
-                    <a16:creationId xmlns:a16="http://schemas.microsoft.com/office/drawing/2014/main" id="{8A0EB7E7-8A57-2242-8EB4-511BAF683A95}"/>
-                  </a:ext>
-                </a:extLst>
-              </p:cNvPr>
-              <p:cNvSpPr txBox="1"/>
-              <p:nvPr/>
-            </p:nvSpPr>
-            <p:spPr>
-              <a:xfrm>
-                <a:off x="9904147" y="3833090"/>
-                <a:ext cx="1319645" cy="369332"/>
-              </a:xfrm>
-              <a:prstGeom prst="rect">
-                <a:avLst/>
-              </a:prstGeom>
-              <a:noFill/>
-            </p:spPr>
-            <p:txBody>
-              <a:bodyPr wrap="square" rtlCol="0">
-                <a:spAutoFit/>
-              </a:bodyPr>
-              <a:lstStyle/>
-              <a:p>
-                <a:pPr algn="ctr"/>
-                <a:r>
-                  <a:rPr lang="en-CN" b="1" dirty="0">
-                    <a:latin typeface="Times New Roman" panose="02020603050405020304" pitchFamily="18" charset="0"/>
-                    <a:cs typeface="Times New Roman" panose="02020603050405020304" pitchFamily="18" charset="0"/>
-                  </a:rPr>
-                  <a:t>TX </a:t>
-                </a:r>
-                <a:r>
-                  <a:rPr lang="en-US" altLang="zh-CN" b="1" dirty="0">
-                    <a:latin typeface="Times New Roman" panose="02020603050405020304" pitchFamily="18" charset="0"/>
-                    <a:cs typeface="Times New Roman" panose="02020603050405020304" pitchFamily="18" charset="0"/>
-                  </a:rPr>
-                  <a:t>3</a:t>
-                </a:r>
-              </a:p>
-            </p:txBody>
-          </p:sp>
-          <p:cxnSp>
-            <p:nvCxnSpPr>
-              <p:cNvPr id="176" name="Elbow Connector 175">
-                <a:extLst>
-                  <a:ext uri="{FF2B5EF4-FFF2-40B4-BE49-F238E27FC236}">
-                    <a16:creationId xmlns:a16="http://schemas.microsoft.com/office/drawing/2014/main" id="{5C933200-6652-9B4E-8B22-A5F211E21E05}"/>
-                  </a:ext>
-                </a:extLst>
-              </p:cNvPr>
-              <p:cNvCxnSpPr>
-                <a:cxnSpLocks/>
-                <a:stCxn id="50" idx="3"/>
-                <a:endCxn id="165" idx="1"/>
-              </p:cNvCxnSpPr>
-              <p:nvPr/>
-            </p:nvCxnSpPr>
-            <p:spPr>
-              <a:xfrm flipV="1">
-                <a:off x="7451761" y="1764221"/>
-                <a:ext cx="2724514" cy="738378"/>
-              </a:xfrm>
-              <a:prstGeom prst="bentConnector3">
-                <a:avLst>
-                  <a:gd name="adj1" fmla="val 16438"/>
-                </a:avLst>
-              </a:prstGeom>
-              <a:ln w="12700">
-                <a:solidFill>
-                  <a:schemeClr val="tx1"/>
-                </a:solidFill>
-                <a:tailEnd type="stealth" w="lg" len="lg"/>
-              </a:ln>
-            </p:spPr>
-            <p:style>
-              <a:lnRef idx="1">
-                <a:schemeClr val="accent1"/>
-              </a:lnRef>
-              <a:fillRef idx="0">
-                <a:schemeClr val="accent1"/>
-              </a:fillRef>
-              <a:effectRef idx="0">
-                <a:schemeClr val="accent1"/>
-              </a:effectRef>
-              <a:fontRef idx="minor">
-                <a:schemeClr val="tx1"/>
-              </a:fontRef>
-            </p:style>
-          </p:cxnSp>
-          <p:sp>
-            <p:nvSpPr>
-              <p:cNvPr id="207" name="Rectangle 206">
-                <a:extLst>
-                  <a:ext uri="{FF2B5EF4-FFF2-40B4-BE49-F238E27FC236}">
-                    <a16:creationId xmlns:a16="http://schemas.microsoft.com/office/drawing/2014/main" id="{529ED4D3-85D9-8F4D-A293-2719A08D4360}"/>
-                  </a:ext>
-                </a:extLst>
-              </p:cNvPr>
-              <p:cNvSpPr/>
-              <p:nvPr/>
-            </p:nvSpPr>
-            <p:spPr>
-              <a:xfrm>
-                <a:off x="10172346" y="1213592"/>
-                <a:ext cx="775386" cy="291737"/>
-              </a:xfrm>
-              <a:prstGeom prst="rect">
-                <a:avLst/>
-              </a:prstGeom>
-              <a:noFill/>
-              <a:ln w="19050">
-                <a:solidFill>
-                  <a:schemeClr val="accent2"/>
-                </a:solidFill>
-              </a:ln>
-            </p:spPr>
-            <p:style>
-              <a:lnRef idx="2">
-                <a:schemeClr val="accent1">
-                  <a:shade val="50000"/>
-                </a:schemeClr>
-              </a:lnRef>
-              <a:fillRef idx="1">
-                <a:schemeClr val="accent1"/>
-              </a:fillRef>
-              <a:effectRef idx="0">
-                <a:schemeClr val="accent1"/>
-              </a:effectRef>
-              <a:fontRef idx="minor">
-                <a:schemeClr val="lt1"/>
-              </a:fontRef>
-            </p:style>
-            <p:txBody>
-              <a:bodyPr rtlCol="0" anchor="ctr"/>
-              <a:lstStyle/>
-              <a:p>
-                <a:pPr algn="ctr"/>
-                <a:r>
-                  <a:rPr lang="en-CN" sz="1200" dirty="0">
-                    <a:solidFill>
-                      <a:schemeClr val="accent2">
-                        <a:lumMod val="50000"/>
-                      </a:schemeClr>
-                    </a:solidFill>
-                  </a:rPr>
-                  <a:t>input_</a:t>
-                </a:r>
-                <a:r>
-                  <a:rPr lang="en-US" altLang="zh-CN" sz="1200" dirty="0">
-                    <a:solidFill>
-                      <a:schemeClr val="accent2">
-                        <a:lumMod val="50000"/>
-                      </a:schemeClr>
-                    </a:solidFill>
-                  </a:rPr>
-                  <a:t>1</a:t>
-                </a:r>
-                <a:endParaRPr lang="en-CN" sz="1200" dirty="0">
-                  <a:solidFill>
-                    <a:schemeClr val="accent2">
-                      <a:lumMod val="50000"/>
-                    </a:schemeClr>
-                  </a:solidFill>
-                </a:endParaRPr>
-              </a:p>
-            </p:txBody>
-          </p:sp>
-          <p:sp>
-            <p:nvSpPr>
-              <p:cNvPr id="212" name="TextBox 211">
-                <a:extLst>
-                  <a:ext uri="{FF2B5EF4-FFF2-40B4-BE49-F238E27FC236}">
-                    <a16:creationId xmlns:a16="http://schemas.microsoft.com/office/drawing/2014/main" id="{3841A8D2-DB7E-814A-80A0-AA23E018B328}"/>
-                  </a:ext>
-                </a:extLst>
-              </p:cNvPr>
-              <p:cNvSpPr txBox="1"/>
-              <p:nvPr/>
-            </p:nvSpPr>
-            <p:spPr>
-              <a:xfrm>
-                <a:off x="10381144" y="766095"/>
-                <a:ext cx="357790" cy="369332"/>
-              </a:xfrm>
-              <a:prstGeom prst="rect">
-                <a:avLst/>
-              </a:prstGeom>
-              <a:noFill/>
-            </p:spPr>
-            <p:txBody>
-              <a:bodyPr wrap="none" rtlCol="0">
-                <a:spAutoFit/>
-              </a:bodyPr>
-              <a:lstStyle/>
-              <a:p>
-                <a:r>
-                  <a:rPr lang="en-US" dirty="0">
-                    <a:solidFill>
-                      <a:schemeClr val="accent2">
-                        <a:lumMod val="50000"/>
-                      </a:schemeClr>
-                    </a:solidFill>
-                  </a:rPr>
-                  <a:t>·</a:t>
-                </a:r>
-                <a:r>
-                  <a:rPr lang="en-US" altLang="zh-CN" dirty="0">
-                    <a:solidFill>
-                      <a:schemeClr val="accent2">
-                        <a:lumMod val="50000"/>
-                      </a:schemeClr>
-                    </a:solidFill>
-                  </a:rPr>
-                  <a:t>··</a:t>
-                </a:r>
-                <a:endParaRPr lang="en-CN" dirty="0">
-                  <a:solidFill>
-                    <a:schemeClr val="accent2">
-                      <a:lumMod val="50000"/>
-                    </a:schemeClr>
-                  </a:solidFill>
-                </a:endParaRPr>
-              </a:p>
-            </p:txBody>
-          </p:sp>
-          <p:sp>
-            <p:nvSpPr>
-              <p:cNvPr id="213" name="Rectangle 212">
-                <a:extLst>
-                  <a:ext uri="{FF2B5EF4-FFF2-40B4-BE49-F238E27FC236}">
-                    <a16:creationId xmlns:a16="http://schemas.microsoft.com/office/drawing/2014/main" id="{7E51612E-9CBB-C24E-8812-48936A9923D4}"/>
-                  </a:ext>
-                </a:extLst>
-              </p:cNvPr>
-              <p:cNvSpPr/>
-              <p:nvPr/>
-            </p:nvSpPr>
-            <p:spPr>
-              <a:xfrm>
-                <a:off x="10090044" y="2280959"/>
-                <a:ext cx="947853" cy="1260087"/>
-              </a:xfrm>
-              <a:prstGeom prst="rect">
-                <a:avLst/>
-              </a:prstGeom>
-              <a:noFill/>
-              <a:ln w="19050">
-                <a:solidFill>
-                  <a:schemeClr val="accent1"/>
-                </a:solidFill>
-              </a:ln>
-            </p:spPr>
-            <p:style>
-              <a:lnRef idx="2">
-                <a:schemeClr val="accent1">
-                  <a:shade val="50000"/>
-                </a:schemeClr>
-              </a:lnRef>
-              <a:fillRef idx="1">
-                <a:schemeClr val="accent1"/>
-              </a:fillRef>
-              <a:effectRef idx="0">
-                <a:schemeClr val="accent1"/>
-              </a:effectRef>
-              <a:fontRef idx="minor">
-                <a:schemeClr val="lt1"/>
-              </a:fontRef>
-            </p:style>
-            <p:txBody>
-              <a:bodyPr rtlCol="0" anchor="ctr"/>
-              <a:lstStyle/>
-              <a:p>
-                <a:pPr algn="ctr"/>
-                <a:endParaRPr lang="en-CN"/>
-              </a:p>
-            </p:txBody>
-          </p:sp>
-          <p:sp>
-            <p:nvSpPr>
-              <p:cNvPr id="214" name="Rectangle 213">
-                <a:extLst>
-                  <a:ext uri="{FF2B5EF4-FFF2-40B4-BE49-F238E27FC236}">
-                    <a16:creationId xmlns:a16="http://schemas.microsoft.com/office/drawing/2014/main" id="{2DDE09FB-4CDA-794C-B996-C4CA484BDD8C}"/>
-                  </a:ext>
-                </a:extLst>
-              </p:cNvPr>
-              <p:cNvSpPr/>
-              <p:nvPr/>
-            </p:nvSpPr>
-            <p:spPr>
-              <a:xfrm>
-                <a:off x="10176277" y="2359111"/>
-                <a:ext cx="775386" cy="291737"/>
-              </a:xfrm>
-              <a:prstGeom prst="rect">
-                <a:avLst/>
-              </a:prstGeom>
-              <a:noFill/>
-              <a:ln w="19050">
-                <a:solidFill>
-                  <a:schemeClr val="accent1"/>
-                </a:solidFill>
-              </a:ln>
-            </p:spPr>
-            <p:style>
-              <a:lnRef idx="2">
-                <a:schemeClr val="accent1">
-                  <a:shade val="50000"/>
-                </a:schemeClr>
-              </a:lnRef>
-              <a:fillRef idx="1">
-                <a:schemeClr val="accent1"/>
-              </a:fillRef>
-              <a:effectRef idx="0">
-                <a:schemeClr val="accent1"/>
-              </a:effectRef>
-              <a:fontRef idx="minor">
-                <a:schemeClr val="lt1"/>
-              </a:fontRef>
-            </p:style>
-            <p:txBody>
-              <a:bodyPr rtlCol="0" anchor="ctr"/>
-              <a:lstStyle/>
-              <a:p>
-                <a:pPr algn="ctr"/>
-                <a:r>
-                  <a:rPr lang="en-CN" sz="1200" dirty="0">
-                    <a:solidFill>
-                      <a:schemeClr val="accent1">
-                        <a:lumMod val="50000"/>
-                      </a:schemeClr>
-                    </a:solidFill>
-                  </a:rPr>
-                  <a:t>output_</a:t>
-                </a:r>
-                <a:r>
-                  <a:rPr lang="en-US" sz="1200" dirty="0">
-                    <a:solidFill>
-                      <a:schemeClr val="accent1">
-                        <a:lumMod val="50000"/>
-                      </a:schemeClr>
-                    </a:solidFill>
-                  </a:rPr>
-                  <a:t>0</a:t>
-                </a:r>
-                <a:endParaRPr lang="en-CN" sz="1200" dirty="0">
-                  <a:solidFill>
-                    <a:schemeClr val="accent1">
-                      <a:lumMod val="50000"/>
-                    </a:schemeClr>
-                  </a:solidFill>
-                </a:endParaRPr>
-              </a:p>
-            </p:txBody>
-          </p:sp>
-          <p:sp>
-            <p:nvSpPr>
-              <p:cNvPr id="215" name="Rectangle 214">
-                <a:extLst>
-                  <a:ext uri="{FF2B5EF4-FFF2-40B4-BE49-F238E27FC236}">
-                    <a16:creationId xmlns:a16="http://schemas.microsoft.com/office/drawing/2014/main" id="{2EE586FF-B607-3C4C-8F65-BC325659DED5}"/>
-                  </a:ext>
-                </a:extLst>
-              </p:cNvPr>
-              <p:cNvSpPr/>
-              <p:nvPr/>
-            </p:nvSpPr>
-            <p:spPr>
-              <a:xfrm>
-                <a:off x="10176277" y="2767810"/>
-                <a:ext cx="775386" cy="291737"/>
-              </a:xfrm>
-              <a:prstGeom prst="rect">
-                <a:avLst/>
-              </a:prstGeom>
-              <a:noFill/>
-              <a:ln w="19050">
-                <a:solidFill>
-                  <a:schemeClr val="accent1"/>
-                </a:solidFill>
-              </a:ln>
-            </p:spPr>
-            <p:style>
-              <a:lnRef idx="2">
-                <a:schemeClr val="accent1">
-                  <a:shade val="50000"/>
-                </a:schemeClr>
-              </a:lnRef>
-              <a:fillRef idx="1">
-                <a:schemeClr val="accent1"/>
-              </a:fillRef>
-              <a:effectRef idx="0">
-                <a:schemeClr val="accent1"/>
-              </a:effectRef>
-              <a:fontRef idx="minor">
-                <a:schemeClr val="lt1"/>
-              </a:fontRef>
-            </p:style>
-            <p:txBody>
-              <a:bodyPr rtlCol="0" anchor="ctr"/>
-              <a:lstStyle/>
-              <a:p>
-                <a:pPr algn="ctr"/>
-                <a:r>
-                  <a:rPr lang="en-CN" sz="1200" dirty="0">
-                    <a:solidFill>
-                      <a:schemeClr val="accent1">
-                        <a:lumMod val="50000"/>
-                      </a:schemeClr>
-                    </a:solidFill>
-                  </a:rPr>
-                  <a:t>output_</a:t>
-                </a:r>
-                <a:r>
-                  <a:rPr lang="en-US" sz="1200" dirty="0">
-                    <a:solidFill>
-                      <a:schemeClr val="accent1">
-                        <a:lumMod val="50000"/>
-                      </a:schemeClr>
-                    </a:solidFill>
-                  </a:rPr>
-                  <a:t>1</a:t>
-                </a:r>
-                <a:endParaRPr lang="en-CN" sz="1200" dirty="0">
-                  <a:solidFill>
-                    <a:schemeClr val="accent1">
-                      <a:lumMod val="50000"/>
-                    </a:schemeClr>
-                  </a:solidFill>
-                </a:endParaRPr>
-              </a:p>
-            </p:txBody>
-          </p:sp>
-          <p:sp>
-            <p:nvSpPr>
-              <p:cNvPr id="216" name="TextBox 215">
-                <a:extLst>
-                  <a:ext uri="{FF2B5EF4-FFF2-40B4-BE49-F238E27FC236}">
-                    <a16:creationId xmlns:a16="http://schemas.microsoft.com/office/drawing/2014/main" id="{AB8A6C9F-61A8-454A-9050-148917297722}"/>
-                  </a:ext>
-                </a:extLst>
-              </p:cNvPr>
-              <p:cNvSpPr txBox="1"/>
-              <p:nvPr/>
-            </p:nvSpPr>
-            <p:spPr>
-              <a:xfrm>
-                <a:off x="10385075" y="3134261"/>
-                <a:ext cx="357790" cy="369332"/>
-              </a:xfrm>
-              <a:prstGeom prst="rect">
-                <a:avLst/>
-              </a:prstGeom>
-              <a:noFill/>
-            </p:spPr>
-            <p:txBody>
-              <a:bodyPr wrap="none" rtlCol="0">
-                <a:spAutoFit/>
-              </a:bodyPr>
-              <a:lstStyle/>
-              <a:p>
-                <a:r>
-                  <a:rPr lang="en-US" dirty="0">
-                    <a:solidFill>
-                      <a:schemeClr val="accent1">
-                        <a:lumMod val="50000"/>
-                      </a:schemeClr>
-                    </a:solidFill>
-                  </a:rPr>
-                  <a:t>·</a:t>
-                </a:r>
-                <a:r>
-                  <a:rPr lang="en-US" altLang="zh-CN" dirty="0">
-                    <a:solidFill>
-                      <a:schemeClr val="accent1">
-                        <a:lumMod val="50000"/>
-                      </a:schemeClr>
-                    </a:solidFill>
-                  </a:rPr>
-                  <a:t>··</a:t>
-                </a:r>
-                <a:endParaRPr lang="en-CN" dirty="0">
-                  <a:solidFill>
-                    <a:schemeClr val="accent1">
-                      <a:lumMod val="50000"/>
-                    </a:schemeClr>
-                  </a:solidFill>
-                </a:endParaRPr>
-              </a:p>
-            </p:txBody>
-          </p:sp>
-          <p:sp>
-            <p:nvSpPr>
-              <p:cNvPr id="217" name="Rounded Rectangle 216">
-                <a:extLst>
-                  <a:ext uri="{FF2B5EF4-FFF2-40B4-BE49-F238E27FC236}">
-                    <a16:creationId xmlns:a16="http://schemas.microsoft.com/office/drawing/2014/main" id="{53DDA467-4843-714E-BB8A-96AFA11B2B31}"/>
-                  </a:ext>
-                </a:extLst>
-              </p:cNvPr>
-              <p:cNvSpPr/>
-              <p:nvPr/>
-            </p:nvSpPr>
-            <p:spPr>
-              <a:xfrm>
-                <a:off x="2576899" y="148503"/>
-                <a:ext cx="1319645" cy="3677328"/>
-              </a:xfrm>
-              <a:prstGeom prst="roundRect">
-                <a:avLst>
-                  <a:gd name="adj" fmla="val 6838"/>
-                </a:avLst>
-              </a:prstGeom>
-              <a:noFill/>
-              <a:ln w="19050">
-                <a:solidFill>
-                  <a:schemeClr val="tx1"/>
-                </a:solidFill>
-              </a:ln>
-            </p:spPr>
-            <p:style>
-              <a:lnRef idx="2">
-                <a:schemeClr val="accent1">
-                  <a:shade val="50000"/>
-                </a:schemeClr>
-              </a:lnRef>
-              <a:fillRef idx="1">
-                <a:schemeClr val="accent1"/>
-              </a:fillRef>
-              <a:effectRef idx="0">
-                <a:schemeClr val="accent1"/>
-              </a:effectRef>
-              <a:fontRef idx="minor">
-                <a:schemeClr val="lt1"/>
-              </a:fontRef>
-            </p:style>
-            <p:txBody>
-              <a:bodyPr rtlCol="0" anchor="ctr"/>
-              <a:lstStyle/>
-              <a:p>
-                <a:pPr algn="ctr"/>
-                <a:endParaRPr lang="en-CN">
-                  <a:latin typeface="Times New Roman" panose="02020603050405020304" pitchFamily="18" charset="0"/>
-                  <a:cs typeface="Times New Roman" panose="02020603050405020304" pitchFamily="18" charset="0"/>
-                </a:endParaRPr>
-              </a:p>
-            </p:txBody>
-          </p:sp>
-          <p:cxnSp>
-            <p:nvCxnSpPr>
-              <p:cNvPr id="219" name="Straight Connector 218">
-                <a:extLst>
-                  <a:ext uri="{FF2B5EF4-FFF2-40B4-BE49-F238E27FC236}">
-                    <a16:creationId xmlns:a16="http://schemas.microsoft.com/office/drawing/2014/main" id="{21E0D2A8-8AF6-F74A-B355-DED7DF8B4D1F}"/>
-                  </a:ext>
-                </a:extLst>
-              </p:cNvPr>
-              <p:cNvCxnSpPr/>
-              <p:nvPr/>
-            </p:nvCxnSpPr>
-            <p:spPr>
-              <a:xfrm>
-                <a:off x="6404248" y="4677481"/>
-                <a:ext cx="1319645" cy="0"/>
-              </a:xfrm>
-              <a:prstGeom prst="line">
-                <a:avLst/>
-              </a:prstGeom>
-              <a:ln w="19050">
-                <a:solidFill>
-                  <a:schemeClr val="tx1"/>
-                </a:solidFill>
-              </a:ln>
-            </p:spPr>
-            <p:style>
-              <a:lnRef idx="1">
-                <a:schemeClr val="accent1"/>
-              </a:lnRef>
-              <a:fillRef idx="0">
-                <a:schemeClr val="accent1"/>
-              </a:fillRef>
-              <a:effectRef idx="0">
-                <a:schemeClr val="accent1"/>
-              </a:effectRef>
-              <a:fontRef idx="minor">
-                <a:schemeClr val="tx1"/>
-              </a:fontRef>
-            </p:style>
-          </p:cxnSp>
-          <p:sp>
-            <p:nvSpPr>
-              <p:cNvPr id="220" name="Rounded Rectangle 219">
-                <a:extLst>
-                  <a:ext uri="{FF2B5EF4-FFF2-40B4-BE49-F238E27FC236}">
-                    <a16:creationId xmlns:a16="http://schemas.microsoft.com/office/drawing/2014/main" id="{B2F6EFB4-D128-444F-8BB6-21B5CEAA3A65}"/>
-                  </a:ext>
-                </a:extLst>
-              </p:cNvPr>
-              <p:cNvSpPr/>
-              <p:nvPr/>
-            </p:nvSpPr>
-            <p:spPr>
-              <a:xfrm>
-                <a:off x="6404252" y="4365467"/>
-                <a:ext cx="1319645" cy="1553918"/>
-              </a:xfrm>
-              <a:prstGeom prst="roundRect">
-                <a:avLst>
-                  <a:gd name="adj" fmla="val 6838"/>
-                </a:avLst>
-              </a:prstGeom>
-              <a:noFill/>
-              <a:ln w="19050">
-                <a:solidFill>
-                  <a:schemeClr val="tx1"/>
-                </a:solidFill>
-              </a:ln>
-            </p:spPr>
-            <p:style>
-              <a:lnRef idx="2">
-                <a:schemeClr val="accent1">
-                  <a:shade val="50000"/>
-                </a:schemeClr>
-              </a:lnRef>
-              <a:fillRef idx="1">
-                <a:schemeClr val="accent1"/>
-              </a:fillRef>
-              <a:effectRef idx="0">
-                <a:schemeClr val="accent1"/>
-              </a:effectRef>
-              <a:fontRef idx="minor">
-                <a:schemeClr val="lt1"/>
-              </a:fontRef>
-            </p:style>
-            <p:txBody>
-              <a:bodyPr rtlCol="0" anchor="ctr"/>
-              <a:lstStyle/>
-              <a:p>
-                <a:pPr algn="ctr"/>
-                <a:endParaRPr lang="en-CN">
-                  <a:latin typeface="Times New Roman" panose="02020603050405020304" pitchFamily="18" charset="0"/>
-                  <a:cs typeface="Times New Roman" panose="02020603050405020304" pitchFamily="18" charset="0"/>
-                </a:endParaRPr>
-              </a:p>
-            </p:txBody>
-          </p:sp>
-          <p:sp>
-            <p:nvSpPr>
-              <p:cNvPr id="221" name="TextBox 220">
-                <a:extLst>
-                  <a:ext uri="{FF2B5EF4-FFF2-40B4-BE49-F238E27FC236}">
-                    <a16:creationId xmlns:a16="http://schemas.microsoft.com/office/drawing/2014/main" id="{37471DEA-A8CB-C24C-BB9D-40D04F4A94F7}"/>
-                  </a:ext>
-                </a:extLst>
-              </p:cNvPr>
-              <p:cNvSpPr txBox="1"/>
-              <p:nvPr/>
-            </p:nvSpPr>
-            <p:spPr>
-              <a:xfrm>
-                <a:off x="6404248" y="4359261"/>
-                <a:ext cx="1319645" cy="323165"/>
-              </a:xfrm>
-              <a:prstGeom prst="rect">
-                <a:avLst/>
-              </a:prstGeom>
-              <a:noFill/>
-            </p:spPr>
-            <p:txBody>
-              <a:bodyPr wrap="square" rtlCol="0">
-                <a:spAutoFit/>
-              </a:bodyPr>
-              <a:lstStyle/>
-              <a:p>
-                <a:pPr algn="ctr"/>
-                <a:r>
-                  <a:rPr lang="en-US" sz="1500" dirty="0"/>
-                  <a:t>h</a:t>
-                </a:r>
-                <a:r>
-                  <a:rPr lang="en-US" sz="1500" dirty="0">
-                    <a:effectLst/>
-                  </a:rPr>
-                  <a:t>ash_</a:t>
-                </a:r>
-                <a:r>
-                  <a:rPr lang="en-US" altLang="zh-CN" sz="1500" dirty="0"/>
-                  <a:t>4</a:t>
-                </a:r>
-                <a:endParaRPr lang="en-US" sz="1500" dirty="0">
-                  <a:effectLst/>
-                </a:endParaRPr>
-              </a:p>
-            </p:txBody>
-          </p:sp>
-          <p:sp>
-            <p:nvSpPr>
-              <p:cNvPr id="222" name="Rectangle 221">
-                <a:extLst>
-                  <a:ext uri="{FF2B5EF4-FFF2-40B4-BE49-F238E27FC236}">
-                    <a16:creationId xmlns:a16="http://schemas.microsoft.com/office/drawing/2014/main" id="{ECAF4E8F-C39D-1B40-9F96-00385A0FAF2E}"/>
-                  </a:ext>
-                </a:extLst>
-              </p:cNvPr>
-              <p:cNvSpPr/>
-              <p:nvPr/>
-            </p:nvSpPr>
-            <p:spPr>
-              <a:xfrm>
-                <a:off x="6590146" y="4940176"/>
-                <a:ext cx="947853" cy="409460"/>
-              </a:xfrm>
-              <a:prstGeom prst="rect">
-                <a:avLst/>
-              </a:prstGeom>
-              <a:noFill/>
-              <a:ln w="19050">
-                <a:solidFill>
-                  <a:schemeClr val="accent2"/>
-                </a:solidFill>
-              </a:ln>
-            </p:spPr>
-            <p:style>
-              <a:lnRef idx="2">
-                <a:schemeClr val="accent1">
-                  <a:shade val="50000"/>
-                </a:schemeClr>
-              </a:lnRef>
-              <a:fillRef idx="1">
-                <a:schemeClr val="accent1"/>
-              </a:fillRef>
-              <a:effectRef idx="0">
-                <a:schemeClr val="accent1"/>
-              </a:effectRef>
-              <a:fontRef idx="minor">
-                <a:schemeClr val="lt1"/>
-              </a:fontRef>
-            </p:style>
-            <p:txBody>
-              <a:bodyPr rtlCol="0" anchor="ctr"/>
-              <a:lstStyle/>
-              <a:p>
-                <a:pPr algn="ctr"/>
-                <a:endParaRPr lang="en-CN">
-                  <a:solidFill>
-                    <a:schemeClr val="accent2">
-                      <a:lumMod val="50000"/>
-                    </a:schemeClr>
-                  </a:solidFill>
-                </a:endParaRPr>
-              </a:p>
-            </p:txBody>
-          </p:sp>
-          <p:sp>
-            <p:nvSpPr>
-              <p:cNvPr id="223" name="Rectangle 222">
-                <a:extLst>
-                  <a:ext uri="{FF2B5EF4-FFF2-40B4-BE49-F238E27FC236}">
-                    <a16:creationId xmlns:a16="http://schemas.microsoft.com/office/drawing/2014/main" id="{06C38860-94F5-BC42-81EA-5652D94D1C57}"/>
-                  </a:ext>
-                </a:extLst>
-              </p:cNvPr>
-              <p:cNvSpPr/>
-              <p:nvPr/>
-            </p:nvSpPr>
-            <p:spPr>
-              <a:xfrm>
-                <a:off x="6672448" y="5000434"/>
-                <a:ext cx="775386" cy="291737"/>
-              </a:xfrm>
-              <a:prstGeom prst="rect">
-                <a:avLst/>
-              </a:prstGeom>
-              <a:noFill/>
-              <a:ln w="19050">
-                <a:solidFill>
-                  <a:schemeClr val="accent2"/>
-                </a:solidFill>
-              </a:ln>
-            </p:spPr>
-            <p:style>
-              <a:lnRef idx="2">
-                <a:schemeClr val="accent1">
-                  <a:shade val="50000"/>
-                </a:schemeClr>
-              </a:lnRef>
-              <a:fillRef idx="1">
-                <a:schemeClr val="accent1"/>
-              </a:fillRef>
-              <a:effectRef idx="0">
-                <a:schemeClr val="accent1"/>
-              </a:effectRef>
-              <a:fontRef idx="minor">
-                <a:schemeClr val="lt1"/>
-              </a:fontRef>
-            </p:style>
-            <p:txBody>
-              <a:bodyPr rtlCol="0" anchor="ctr"/>
-              <a:lstStyle/>
-              <a:p>
-                <a:pPr algn="ctr"/>
-                <a:r>
-                  <a:rPr lang="en-CN" sz="1200" dirty="0">
-                    <a:solidFill>
-                      <a:schemeClr val="accent2">
-                        <a:lumMod val="50000"/>
-                      </a:schemeClr>
-                    </a:solidFill>
-                  </a:rPr>
-                  <a:t>input_</a:t>
-                </a:r>
-                <a:r>
-                  <a:rPr lang="en-US" sz="1200" dirty="0">
-                    <a:solidFill>
-                      <a:schemeClr val="accent2">
-                        <a:lumMod val="50000"/>
-                      </a:schemeClr>
-                    </a:solidFill>
-                  </a:rPr>
-                  <a:t>0</a:t>
-                </a:r>
-                <a:endParaRPr lang="en-CN" sz="1200" dirty="0">
-                  <a:solidFill>
-                    <a:schemeClr val="accent2">
-                      <a:lumMod val="50000"/>
-                    </a:schemeClr>
-                  </a:solidFill>
-                </a:endParaRPr>
-              </a:p>
-            </p:txBody>
-          </p:sp>
-          <p:sp>
-            <p:nvSpPr>
-              <p:cNvPr id="224" name="TextBox 223">
-                <a:extLst>
-                  <a:ext uri="{FF2B5EF4-FFF2-40B4-BE49-F238E27FC236}">
-                    <a16:creationId xmlns:a16="http://schemas.microsoft.com/office/drawing/2014/main" id="{04D45AE3-A116-CD4E-AF36-7170352CCF3E}"/>
-                  </a:ext>
-                </a:extLst>
-              </p:cNvPr>
-              <p:cNvSpPr txBox="1"/>
-              <p:nvPr/>
-            </p:nvSpPr>
-            <p:spPr>
-              <a:xfrm>
-                <a:off x="6404248" y="5925711"/>
-                <a:ext cx="1319645" cy="369332"/>
-              </a:xfrm>
-              <a:prstGeom prst="rect">
-                <a:avLst/>
-              </a:prstGeom>
-              <a:noFill/>
-            </p:spPr>
-            <p:txBody>
-              <a:bodyPr wrap="square" rtlCol="0">
-                <a:spAutoFit/>
-              </a:bodyPr>
-              <a:lstStyle/>
-              <a:p>
-                <a:pPr algn="ctr"/>
-                <a:r>
-                  <a:rPr lang="en-CN" b="1" dirty="0">
-                    <a:latin typeface="Times New Roman" panose="02020603050405020304" pitchFamily="18" charset="0"/>
-                    <a:cs typeface="Times New Roman" panose="02020603050405020304" pitchFamily="18" charset="0"/>
-                  </a:rPr>
-                  <a:t>TX </a:t>
-                </a:r>
-                <a:r>
-                  <a:rPr lang="en-US" altLang="zh-CN" b="1" dirty="0">
-                    <a:latin typeface="Times New Roman" panose="02020603050405020304" pitchFamily="18" charset="0"/>
-                    <a:cs typeface="Times New Roman" panose="02020603050405020304" pitchFamily="18" charset="0"/>
-                  </a:rPr>
-                  <a:t>4</a:t>
-                </a:r>
-              </a:p>
-            </p:txBody>
-          </p:sp>
-          <p:sp>
-            <p:nvSpPr>
-              <p:cNvPr id="227" name="Rectangle 226">
-                <a:extLst>
-                  <a:ext uri="{FF2B5EF4-FFF2-40B4-BE49-F238E27FC236}">
-                    <a16:creationId xmlns:a16="http://schemas.microsoft.com/office/drawing/2014/main" id="{AC857872-62F3-D741-877F-EA3DD7FE695F}"/>
-                  </a:ext>
-                </a:extLst>
-              </p:cNvPr>
-              <p:cNvSpPr/>
-              <p:nvPr/>
-            </p:nvSpPr>
-            <p:spPr>
-              <a:xfrm>
-                <a:off x="6590146" y="5409895"/>
-                <a:ext cx="947853" cy="409460"/>
-              </a:xfrm>
-              <a:prstGeom prst="rect">
-                <a:avLst/>
-              </a:prstGeom>
-              <a:noFill/>
-              <a:ln w="19050">
-                <a:solidFill>
-                  <a:schemeClr val="accent1"/>
-                </a:solidFill>
-              </a:ln>
-            </p:spPr>
-            <p:style>
-              <a:lnRef idx="2">
-                <a:schemeClr val="accent1">
-                  <a:shade val="50000"/>
-                </a:schemeClr>
-              </a:lnRef>
-              <a:fillRef idx="1">
-                <a:schemeClr val="accent1"/>
-              </a:fillRef>
-              <a:effectRef idx="0">
-                <a:schemeClr val="accent1"/>
-              </a:effectRef>
-              <a:fontRef idx="minor">
-                <a:schemeClr val="lt1"/>
-              </a:fontRef>
-            </p:style>
-            <p:txBody>
-              <a:bodyPr rtlCol="0" anchor="ctr"/>
-              <a:lstStyle/>
-              <a:p>
-                <a:pPr algn="ctr"/>
-                <a:endParaRPr lang="en-CN"/>
-              </a:p>
-            </p:txBody>
-          </p:sp>
-          <p:sp>
-            <p:nvSpPr>
-              <p:cNvPr id="228" name="Rectangle 227">
-                <a:extLst>
-                  <a:ext uri="{FF2B5EF4-FFF2-40B4-BE49-F238E27FC236}">
-                    <a16:creationId xmlns:a16="http://schemas.microsoft.com/office/drawing/2014/main" id="{1FA979D5-AD7F-C246-AB28-F54A3D043CA9}"/>
-                  </a:ext>
-                </a:extLst>
-              </p:cNvPr>
-              <p:cNvSpPr/>
-              <p:nvPr/>
-            </p:nvSpPr>
-            <p:spPr>
-              <a:xfrm>
-                <a:off x="6672448" y="5468756"/>
-                <a:ext cx="775386" cy="291737"/>
-              </a:xfrm>
-              <a:prstGeom prst="rect">
-                <a:avLst/>
-              </a:prstGeom>
-              <a:noFill/>
-              <a:ln w="19050">
-                <a:solidFill>
-                  <a:schemeClr val="accent1"/>
-                </a:solidFill>
-              </a:ln>
-            </p:spPr>
-            <p:style>
-              <a:lnRef idx="2">
-                <a:schemeClr val="accent1">
-                  <a:shade val="50000"/>
-                </a:schemeClr>
-              </a:lnRef>
-              <a:fillRef idx="1">
-                <a:schemeClr val="accent1"/>
-              </a:fillRef>
-              <a:effectRef idx="0">
-                <a:schemeClr val="accent1"/>
-              </a:effectRef>
-              <a:fontRef idx="minor">
-                <a:schemeClr val="lt1"/>
-              </a:fontRef>
-            </p:style>
-            <p:txBody>
-              <a:bodyPr rtlCol="0" anchor="ctr"/>
-              <a:lstStyle/>
-              <a:p>
-                <a:pPr algn="ctr"/>
-                <a:r>
-                  <a:rPr lang="en-CN" sz="1200" dirty="0">
-                    <a:solidFill>
-                      <a:schemeClr val="accent1">
-                        <a:lumMod val="50000"/>
-                      </a:schemeClr>
-                    </a:solidFill>
-                  </a:rPr>
-                  <a:t>output_</a:t>
-                </a:r>
-                <a:r>
-                  <a:rPr lang="en-US" sz="1200" dirty="0">
-                    <a:solidFill>
-                      <a:schemeClr val="accent1">
-                        <a:lumMod val="50000"/>
-                      </a:schemeClr>
-                    </a:solidFill>
-                  </a:rPr>
-                  <a:t>0</a:t>
-                </a:r>
-                <a:endParaRPr lang="en-CN" sz="1200" dirty="0">
-                  <a:solidFill>
-                    <a:schemeClr val="accent1">
-                      <a:lumMod val="50000"/>
-                    </a:schemeClr>
-                  </a:solidFill>
-                </a:endParaRPr>
-              </a:p>
-            </p:txBody>
-          </p:sp>
-          <p:cxnSp>
-            <p:nvCxnSpPr>
-              <p:cNvPr id="231" name="Elbow Connector 230">
-                <a:extLst>
-                  <a:ext uri="{FF2B5EF4-FFF2-40B4-BE49-F238E27FC236}">
-                    <a16:creationId xmlns:a16="http://schemas.microsoft.com/office/drawing/2014/main" id="{A0FE882D-E3F2-FB48-8DB4-4BF301919A69}"/>
-                  </a:ext>
-                </a:extLst>
-              </p:cNvPr>
-              <p:cNvCxnSpPr>
-                <a:cxnSpLocks/>
-                <a:stCxn id="102" idx="3"/>
-                <a:endCxn id="223" idx="1"/>
-              </p:cNvCxnSpPr>
-              <p:nvPr/>
-            </p:nvCxnSpPr>
-            <p:spPr>
-              <a:xfrm>
-                <a:off x="5788895" y="2911332"/>
-                <a:ext cx="883553" cy="2234971"/>
-              </a:xfrm>
-              <a:prstGeom prst="bentConnector3">
-                <a:avLst>
-                  <a:gd name="adj1" fmla="val 50000"/>
-                </a:avLst>
-              </a:prstGeom>
-              <a:ln w="12700">
-                <a:solidFill>
-                  <a:schemeClr val="tx1"/>
-                </a:solidFill>
-                <a:tailEnd type="stealth" w="lg" len="lg"/>
-              </a:ln>
-            </p:spPr>
-            <p:style>
-              <a:lnRef idx="1">
-                <a:schemeClr val="accent1"/>
-              </a:lnRef>
-              <a:fillRef idx="0">
-                <a:schemeClr val="accent1"/>
-              </a:fillRef>
-              <a:effectRef idx="0">
-                <a:schemeClr val="accent1"/>
-              </a:effectRef>
-              <a:fontRef idx="minor">
-                <a:schemeClr val="tx1"/>
-              </a:fontRef>
-            </p:style>
-          </p:cxnSp>
-        </p:grpSp>
-        <p:sp>
-          <p:nvSpPr>
-            <p:cNvPr id="237" name="Rounded Rectangle 236">
-              <a:extLst>
-                <a:ext uri="{FF2B5EF4-FFF2-40B4-BE49-F238E27FC236}">
-                  <a16:creationId xmlns:a16="http://schemas.microsoft.com/office/drawing/2014/main" id="{3864D9EF-DB38-9547-98A3-57300C4B5BAD}"/>
-                </a:ext>
-              </a:extLst>
-            </p:cNvPr>
-            <p:cNvSpPr/>
-            <p:nvPr/>
-          </p:nvSpPr>
-          <p:spPr>
-            <a:xfrm>
-              <a:off x="1924546" y="48737"/>
-              <a:ext cx="9921254" cy="6384937"/>
-            </a:xfrm>
-            <a:prstGeom prst="roundRect">
-              <a:avLst>
-                <a:gd name="adj" fmla="val 1152"/>
-              </a:avLst>
-            </a:prstGeom>
-            <a:noFill/>
-            <a:ln w="19050">
-              <a:solidFill>
-                <a:schemeClr val="tx1"/>
-              </a:solidFill>
-              <a:prstDash val="dash"/>
-            </a:ln>
-          </p:spPr>
-          <p:style>
-            <a:lnRef idx="2">
-              <a:schemeClr val="accent1">
-                <a:shade val="50000"/>
-              </a:schemeClr>
-            </a:lnRef>
-            <a:fillRef idx="1">
-              <a:schemeClr val="accent1"/>
-            </a:fillRef>
-            <a:effectRef idx="0">
-              <a:schemeClr val="accent1"/>
-            </a:effectRef>
-            <a:fontRef idx="minor">
-              <a:schemeClr val="lt1"/>
-            </a:fontRef>
-          </p:style>
-          <p:txBody>
-            <a:bodyPr rtlCol="0" anchor="ctr"/>
-            <a:lstStyle/>
-            <a:p>
-              <a:pPr algn="ctr"/>
-              <a:endParaRPr lang="en-CN"/>
-            </a:p>
-          </p:txBody>
-        </p:sp>
-      </p:grpSp>
+          <a:prstGeom prst="rect">
+            <a:avLst/>
+          </a:prstGeom>
+          <a:noFill/>
+        </p:spPr>
+        <p:txBody>
+          <a:bodyPr wrap="square" rtlCol="0">
+            <a:spAutoFit/>
+          </a:bodyPr>
+          <a:lstStyle/>
+          <a:p>
+            <a:pPr algn="ctr"/>
+            <a:r>
+              <a:rPr lang="en-CN" b="1" dirty="0">
+                <a:latin typeface="Times New Roman" panose="02020603050405020304" pitchFamily="18" charset="0"/>
+                <a:cs typeface="Times New Roman" panose="02020603050405020304" pitchFamily="18" charset="0"/>
+              </a:rPr>
+              <a:t>TX 2</a:t>
+            </a:r>
+          </a:p>
+        </p:txBody>
+      </p:sp>
+      <p:sp>
+        <p:nvSpPr>
+          <p:cNvPr id="43" name="Rounded Rectangle 42">
+            <a:extLst>
+              <a:ext uri="{FF2B5EF4-FFF2-40B4-BE49-F238E27FC236}">
+                <a16:creationId xmlns:a16="http://schemas.microsoft.com/office/drawing/2014/main" id="{E86EC7F5-9F24-3048-862E-FD7711E64790}"/>
+              </a:ext>
+            </a:extLst>
+          </p:cNvPr>
+          <p:cNvSpPr/>
+          <p:nvPr/>
+        </p:nvSpPr>
+        <p:spPr>
+          <a:xfrm>
+            <a:off x="5763919" y="361938"/>
+            <a:ext cx="1701752" cy="2134520"/>
+          </a:xfrm>
+          <a:prstGeom prst="roundRect">
+            <a:avLst>
+              <a:gd name="adj" fmla="val 3000"/>
+            </a:avLst>
+          </a:prstGeom>
+          <a:noFill/>
+          <a:ln w="19050">
+            <a:solidFill>
+              <a:schemeClr val="tx1"/>
+            </a:solidFill>
+          </a:ln>
+        </p:spPr>
+        <p:style>
+          <a:lnRef idx="2">
+            <a:schemeClr val="accent1">
+              <a:shade val="50000"/>
+            </a:schemeClr>
+          </a:lnRef>
+          <a:fillRef idx="1">
+            <a:schemeClr val="accent1"/>
+          </a:fillRef>
+          <a:effectRef idx="0">
+            <a:schemeClr val="accent1"/>
+          </a:effectRef>
+          <a:fontRef idx="minor">
+            <a:schemeClr val="lt1"/>
+          </a:fontRef>
+        </p:style>
+        <p:txBody>
+          <a:bodyPr rtlCol="0" anchor="ctr"/>
+          <a:lstStyle/>
+          <a:p>
+            <a:pPr algn="ctr"/>
+            <a:endParaRPr lang="en-CN" sz="1600">
+              <a:latin typeface="Times New Roman" panose="02020603050405020304" pitchFamily="18" charset="0"/>
+              <a:cs typeface="Times New Roman" panose="02020603050405020304" pitchFamily="18" charset="0"/>
+            </a:endParaRPr>
+          </a:p>
+        </p:txBody>
+      </p:sp>
+      <p:sp>
+        <p:nvSpPr>
+          <p:cNvPr id="78" name="TextBox 77">
+            <a:extLst>
+              <a:ext uri="{FF2B5EF4-FFF2-40B4-BE49-F238E27FC236}">
+                <a16:creationId xmlns:a16="http://schemas.microsoft.com/office/drawing/2014/main" id="{17364FC7-069B-E64A-9250-C3350B64111D}"/>
+              </a:ext>
+            </a:extLst>
+          </p:cNvPr>
+          <p:cNvSpPr txBox="1"/>
+          <p:nvPr/>
+        </p:nvSpPr>
+        <p:spPr>
+          <a:xfrm>
+            <a:off x="5763919" y="801159"/>
+            <a:ext cx="1701752" cy="338554"/>
+          </a:xfrm>
+          <a:prstGeom prst="rect">
+            <a:avLst/>
+          </a:prstGeom>
+          <a:noFill/>
+          <a:ln>
+            <a:solidFill>
+              <a:schemeClr val="tx1"/>
+            </a:solidFill>
+          </a:ln>
+        </p:spPr>
+        <p:txBody>
+          <a:bodyPr wrap="square" rtlCol="0">
+            <a:spAutoFit/>
+          </a:bodyPr>
+          <a:lstStyle/>
+          <a:p>
+            <a:pPr algn="ctr"/>
+            <a:r>
+              <a:rPr lang="en-US" sz="1600" dirty="0">
+                <a:effectLst/>
+              </a:rPr>
+              <a:t>hash_2</a:t>
+            </a:r>
+          </a:p>
+        </p:txBody>
+      </p:sp>
+      <p:sp>
+        <p:nvSpPr>
+          <p:cNvPr id="80" name="TextBox 79">
+            <a:extLst>
+              <a:ext uri="{FF2B5EF4-FFF2-40B4-BE49-F238E27FC236}">
+                <a16:creationId xmlns:a16="http://schemas.microsoft.com/office/drawing/2014/main" id="{BD300FB8-48EC-CE4C-9208-A84D0B73FB5C}"/>
+              </a:ext>
+            </a:extLst>
+          </p:cNvPr>
+          <p:cNvSpPr txBox="1"/>
+          <p:nvPr/>
+        </p:nvSpPr>
+        <p:spPr>
+          <a:xfrm>
+            <a:off x="5763919" y="462605"/>
+            <a:ext cx="1701752" cy="338554"/>
+          </a:xfrm>
+          <a:prstGeom prst="rect">
+            <a:avLst/>
+          </a:prstGeom>
+          <a:noFill/>
+          <a:ln w="12700">
+            <a:solidFill>
+              <a:schemeClr val="tx1"/>
+            </a:solidFill>
+          </a:ln>
+        </p:spPr>
+        <p:txBody>
+          <a:bodyPr wrap="square" rtlCol="0">
+            <a:spAutoFit/>
+          </a:bodyPr>
+          <a:lstStyle/>
+          <a:p>
+            <a:pPr algn="ctr"/>
+            <a:r>
+              <a:rPr lang="en-US" sz="1600" dirty="0" err="1">
+                <a:effectLst/>
+              </a:rPr>
+              <a:t>prevBlockHash</a:t>
+            </a:r>
+            <a:endParaRPr lang="en-US" sz="1600" dirty="0">
+              <a:effectLst/>
+            </a:endParaRPr>
+          </a:p>
+        </p:txBody>
+      </p:sp>
+      <p:sp>
+        <p:nvSpPr>
+          <p:cNvPr id="84" name="TextBox 83">
+            <a:extLst>
+              <a:ext uri="{FF2B5EF4-FFF2-40B4-BE49-F238E27FC236}">
+                <a16:creationId xmlns:a16="http://schemas.microsoft.com/office/drawing/2014/main" id="{189686A0-84B7-FA48-975C-1124538B5B1A}"/>
+              </a:ext>
+            </a:extLst>
+          </p:cNvPr>
+          <p:cNvSpPr txBox="1"/>
+          <p:nvPr/>
+        </p:nvSpPr>
+        <p:spPr>
+          <a:xfrm>
+            <a:off x="5763919" y="1139712"/>
+            <a:ext cx="1701752" cy="338554"/>
+          </a:xfrm>
+          <a:prstGeom prst="rect">
+            <a:avLst/>
+          </a:prstGeom>
+          <a:noFill/>
+          <a:ln>
+            <a:solidFill>
+              <a:schemeClr val="tx1"/>
+            </a:solidFill>
+          </a:ln>
+        </p:spPr>
+        <p:txBody>
+          <a:bodyPr wrap="square">
+            <a:spAutoFit/>
+          </a:bodyPr>
+          <a:lstStyle/>
+          <a:p>
+            <a:pPr algn="ctr"/>
+            <a:r>
+              <a:rPr lang="en-US" sz="1600"/>
+              <a:t>COINBASE (25)</a:t>
+            </a:r>
+            <a:endParaRPr lang="en-US" sz="1600" dirty="0"/>
+          </a:p>
+        </p:txBody>
+      </p:sp>
+      <p:sp>
+        <p:nvSpPr>
+          <p:cNvPr id="85" name="TextBox 84">
+            <a:extLst>
+              <a:ext uri="{FF2B5EF4-FFF2-40B4-BE49-F238E27FC236}">
+                <a16:creationId xmlns:a16="http://schemas.microsoft.com/office/drawing/2014/main" id="{6DB67497-6D19-E645-8DDA-878D335DF99D}"/>
+              </a:ext>
+            </a:extLst>
+          </p:cNvPr>
+          <p:cNvSpPr txBox="1"/>
+          <p:nvPr/>
+        </p:nvSpPr>
+        <p:spPr>
+          <a:xfrm>
+            <a:off x="5763919" y="1478266"/>
+            <a:ext cx="1701752" cy="338554"/>
+          </a:xfrm>
+          <a:prstGeom prst="rect">
+            <a:avLst/>
+          </a:prstGeom>
+          <a:noFill/>
+          <a:ln>
+            <a:solidFill>
+              <a:schemeClr val="tx1"/>
+            </a:solidFill>
+          </a:ln>
+        </p:spPr>
+        <p:txBody>
+          <a:bodyPr wrap="square">
+            <a:spAutoFit/>
+          </a:bodyPr>
+          <a:lstStyle/>
+          <a:p>
+            <a:pPr algn="ctr"/>
+            <a:r>
+              <a:rPr lang="en-US" sz="1600" dirty="0" err="1"/>
+              <a:t>coinbase</a:t>
+            </a:r>
+            <a:r>
+              <a:rPr lang="en-US" sz="1600" dirty="0"/>
+              <a:t> </a:t>
+            </a:r>
+            <a:r>
+              <a:rPr lang="en-US" sz="1600" dirty="0" err="1"/>
+              <a:t>tx</a:t>
+            </a:r>
+            <a:endParaRPr lang="en-US" sz="1600" dirty="0"/>
+          </a:p>
+        </p:txBody>
+      </p:sp>
+      <p:sp>
+        <p:nvSpPr>
+          <p:cNvPr id="257" name="TextBox 256">
+            <a:extLst>
+              <a:ext uri="{FF2B5EF4-FFF2-40B4-BE49-F238E27FC236}">
+                <a16:creationId xmlns:a16="http://schemas.microsoft.com/office/drawing/2014/main" id="{2E145802-A2F3-4E49-9075-8C052E69DD7C}"/>
+              </a:ext>
+            </a:extLst>
+          </p:cNvPr>
+          <p:cNvSpPr txBox="1"/>
+          <p:nvPr/>
+        </p:nvSpPr>
+        <p:spPr>
+          <a:xfrm>
+            <a:off x="5763919" y="1816819"/>
+            <a:ext cx="1701752" cy="584775"/>
+          </a:xfrm>
+          <a:prstGeom prst="rect">
+            <a:avLst/>
+          </a:prstGeom>
+          <a:noFill/>
+          <a:ln>
+            <a:solidFill>
+              <a:schemeClr val="tx1"/>
+            </a:solidFill>
+          </a:ln>
+        </p:spPr>
+        <p:txBody>
+          <a:bodyPr wrap="square">
+            <a:spAutoFit/>
+          </a:bodyPr>
+          <a:lstStyle/>
+          <a:p>
+            <a:pPr algn="ctr"/>
+            <a:r>
+              <a:rPr lang="en-US" sz="1600" dirty="0" err="1"/>
+              <a:t>txs</a:t>
+            </a:r>
+            <a:endParaRPr lang="en-US" sz="1600" dirty="0"/>
+          </a:p>
+          <a:p>
+            <a:pPr algn="ctr"/>
+            <a:r>
+              <a:rPr lang="en-US" sz="1600" dirty="0" err="1"/>
+              <a:t>txs</a:t>
+            </a:r>
+            <a:r>
+              <a:rPr lang="en-US" sz="1600" dirty="0"/>
+              <a:t>[0], </a:t>
+            </a:r>
+            <a:r>
+              <a:rPr lang="en-US" sz="1600" dirty="0" err="1"/>
+              <a:t>txs</a:t>
+            </a:r>
+            <a:r>
+              <a:rPr lang="en-US" sz="1600" dirty="0"/>
+              <a:t>[1], …</a:t>
+            </a:r>
+          </a:p>
+        </p:txBody>
+      </p:sp>
     </p:spTree>
     <p:extLst>
       <p:ext uri="{BB962C8B-B14F-4D97-AF65-F5344CB8AC3E}">
@@ -7561,36 +3718,6 @@
           <a:chExt cx="0" cy="0"/>
         </a:xfrm>
       </p:grpSpPr>
-      <p:pic>
-        <p:nvPicPr>
-          <p:cNvPr id="212" name="Picture 211">
-            <a:extLst>
-              <a:ext uri="{FF2B5EF4-FFF2-40B4-BE49-F238E27FC236}">
-                <a16:creationId xmlns:a16="http://schemas.microsoft.com/office/drawing/2014/main" id="{E3641C17-F79D-D549-B904-501DE22990EE}"/>
-              </a:ext>
-            </a:extLst>
-          </p:cNvPr>
-          <p:cNvPicPr>
-            <a:picLocks noChangeAspect="1"/>
-          </p:cNvPicPr>
-          <p:nvPr/>
-        </p:nvPicPr>
-        <p:blipFill>
-          <a:blip r:embed="rId2"/>
-          <a:stretch>
-            <a:fillRect/>
-          </a:stretch>
-        </p:blipFill>
-        <p:spPr>
-          <a:xfrm>
-            <a:off x="-50458545" y="-32001125"/>
-            <a:ext cx="113109089" cy="72950307"/>
-          </a:xfrm>
-          <a:prstGeom prst="rect">
-            <a:avLst/>
-          </a:prstGeom>
-        </p:spPr>
-      </p:pic>
     </p:spTree>
     <p:extLst>
       <p:ext uri="{BB962C8B-B14F-4D97-AF65-F5344CB8AC3E}">
@@ -16984,36 +13111,6 @@
           <a:chExt cx="0" cy="0"/>
         </a:xfrm>
       </p:grpSpPr>
-      <p:pic>
-        <p:nvPicPr>
-          <p:cNvPr id="2" name="Picture 1">
-            <a:extLst>
-              <a:ext uri="{FF2B5EF4-FFF2-40B4-BE49-F238E27FC236}">
-                <a16:creationId xmlns:a16="http://schemas.microsoft.com/office/drawing/2014/main" id="{0C5B7227-2802-CA4A-A3DD-F2E18ED08166}"/>
-              </a:ext>
-            </a:extLst>
-          </p:cNvPr>
-          <p:cNvPicPr>
-            <a:picLocks noChangeAspect="1"/>
-          </p:cNvPicPr>
-          <p:nvPr/>
-        </p:nvPicPr>
-        <p:blipFill>
-          <a:blip r:embed="rId2"/>
-          <a:stretch>
-            <a:fillRect/>
-          </a:stretch>
-        </p:blipFill>
-        <p:spPr>
-          <a:xfrm>
-            <a:off x="-86084230" y="-68542809"/>
-            <a:ext cx="177001715" cy="138198112"/>
-          </a:xfrm>
-          <a:prstGeom prst="rect">
-            <a:avLst/>
-          </a:prstGeom>
-        </p:spPr>
-      </p:pic>
     </p:spTree>
     <p:extLst>
       <p:ext uri="{BB962C8B-B14F-4D97-AF65-F5344CB8AC3E}">

</xml_diff>